<commit_message>
code and doc updated for FI_2024
</commit_message>
<xml_diff>
--- a/doc/FIConstructionWorkFlow.pptx
+++ b/doc/FIConstructionWorkFlow.pptx
@@ -4,8 +4,12 @@
   <p:sldMasterIdLst>
     <p:sldMasterId id="2147483648" r:id="rId1"/>
   </p:sldMasterIdLst>
+  <p:notesMasterIdLst>
+    <p:notesMasterId r:id="rId4"/>
+  </p:notesMasterIdLst>
   <p:sldIdLst>
     <p:sldId id="257" r:id="rId2"/>
+    <p:sldId id="1177" r:id="rId3"/>
   </p:sldIdLst>
   <p:sldSz cx="9144000" cy="6858000" type="screen4x3"/>
   <p:notesSz cx="6858000" cy="9144000"/>
@@ -104,7 +108,613 @@
       </a:defRPr>
     </a:lvl9pPr>
   </p:defaultTextStyle>
+  <p:extLst>
+    <p:ext uri="{EFAFB233-063F-42B5-8137-9DF3F51BA10A}">
+      <p15:sldGuideLst xmlns:p15="http://schemas.microsoft.com/office/powerpoint/2012/main">
+        <p15:guide id="1" orient="horz" pos="2160">
+          <p15:clr>
+            <a:srgbClr val="A4A3A4"/>
+          </p15:clr>
+        </p15:guide>
+        <p15:guide id="2" pos="2880">
+          <p15:clr>
+            <a:srgbClr val="A4A3A4"/>
+          </p15:clr>
+        </p15:guide>
+      </p15:sldGuideLst>
+    </p:ext>
+  </p:extLst>
 </p:presentation>
+</file>
+
+<file path=ppt/notesMasters/notesMaster1.xml><?xml version="1.0" encoding="utf-8"?>
+<p:notesMaster xmlns:a="http://schemas.openxmlformats.org/drawingml/2006/main" xmlns:r="http://schemas.openxmlformats.org/officeDocument/2006/relationships" xmlns:p="http://schemas.openxmlformats.org/presentationml/2006/main">
+  <p:cSld>
+    <p:bg>
+      <p:bgRef idx="1001">
+        <a:schemeClr val="bg1"/>
+      </p:bgRef>
+    </p:bg>
+    <p:spTree>
+      <p:nvGrpSpPr>
+        <p:cNvPr id="1" name=""/>
+        <p:cNvGrpSpPr/>
+        <p:nvPr/>
+      </p:nvGrpSpPr>
+      <p:grpSpPr>
+        <a:xfrm>
+          <a:off x="0" y="0"/>
+          <a:ext cx="0" cy="0"/>
+          <a:chOff x="0" y="0"/>
+          <a:chExt cx="0" cy="0"/>
+        </a:xfrm>
+      </p:grpSpPr>
+      <p:sp>
+        <p:nvSpPr>
+          <p:cNvPr id="2" name="Header Placeholder 1"/>
+          <p:cNvSpPr>
+            <a:spLocks noGrp="1"/>
+          </p:cNvSpPr>
+          <p:nvPr>
+            <p:ph type="hdr" sz="quarter"/>
+          </p:nvPr>
+        </p:nvSpPr>
+        <p:spPr>
+          <a:xfrm>
+            <a:off x="0" y="0"/>
+            <a:ext cx="2971800" cy="458788"/>
+          </a:xfrm>
+          <a:prstGeom prst="rect">
+            <a:avLst/>
+          </a:prstGeom>
+        </p:spPr>
+        <p:txBody>
+          <a:bodyPr vert="horz" lIns="91440" tIns="45720" rIns="91440" bIns="45720" rtlCol="0"/>
+          <a:lstStyle>
+            <a:lvl1pPr algn="l">
+              <a:defRPr sz="1200"/>
+            </a:lvl1pPr>
+          </a:lstStyle>
+          <a:p>
+            <a:endParaRPr lang="en-US"/>
+          </a:p>
+        </p:txBody>
+      </p:sp>
+      <p:sp>
+        <p:nvSpPr>
+          <p:cNvPr id="3" name="Date Placeholder 2"/>
+          <p:cNvSpPr>
+            <a:spLocks noGrp="1"/>
+          </p:cNvSpPr>
+          <p:nvPr>
+            <p:ph type="dt" idx="1"/>
+          </p:nvPr>
+        </p:nvSpPr>
+        <p:spPr>
+          <a:xfrm>
+            <a:off x="3884613" y="0"/>
+            <a:ext cx="2971800" cy="458788"/>
+          </a:xfrm>
+          <a:prstGeom prst="rect">
+            <a:avLst/>
+          </a:prstGeom>
+        </p:spPr>
+        <p:txBody>
+          <a:bodyPr vert="horz" lIns="91440" tIns="45720" rIns="91440" bIns="45720" rtlCol="0"/>
+          <a:lstStyle>
+            <a:lvl1pPr algn="r">
+              <a:defRPr sz="1200"/>
+            </a:lvl1pPr>
+          </a:lstStyle>
+          <a:p>
+            <a:fld id="{276B4D1B-D44C-ED4B-A2D4-8ACA40331428}" type="datetimeFigureOut">
+              <a:rPr lang="en-US" smtClean="0"/>
+              <a:t>4/15/24</a:t>
+            </a:fld>
+            <a:endParaRPr lang="en-US"/>
+          </a:p>
+        </p:txBody>
+      </p:sp>
+      <p:sp>
+        <p:nvSpPr>
+          <p:cNvPr id="4" name="Slide Image Placeholder 3"/>
+          <p:cNvSpPr>
+            <a:spLocks noGrp="1" noRot="1" noChangeAspect="1"/>
+          </p:cNvSpPr>
+          <p:nvPr>
+            <p:ph type="sldImg" idx="2"/>
+          </p:nvPr>
+        </p:nvSpPr>
+        <p:spPr>
+          <a:xfrm>
+            <a:off x="1371600" y="1143000"/>
+            <a:ext cx="4114800" cy="3086100"/>
+          </a:xfrm>
+          <a:prstGeom prst="rect">
+            <a:avLst/>
+          </a:prstGeom>
+          <a:noFill/>
+          <a:ln w="12700">
+            <a:solidFill>
+              <a:prstClr val="black"/>
+            </a:solidFill>
+          </a:ln>
+        </p:spPr>
+        <p:txBody>
+          <a:bodyPr vert="horz" lIns="91440" tIns="45720" rIns="91440" bIns="45720" rtlCol="0" anchor="ctr"/>
+          <a:lstStyle/>
+          <a:p>
+            <a:endParaRPr lang="en-US"/>
+          </a:p>
+        </p:txBody>
+      </p:sp>
+      <p:sp>
+        <p:nvSpPr>
+          <p:cNvPr id="5" name="Notes Placeholder 4"/>
+          <p:cNvSpPr>
+            <a:spLocks noGrp="1"/>
+          </p:cNvSpPr>
+          <p:nvPr>
+            <p:ph type="body" sz="quarter" idx="3"/>
+          </p:nvPr>
+        </p:nvSpPr>
+        <p:spPr>
+          <a:xfrm>
+            <a:off x="685800" y="4400550"/>
+            <a:ext cx="5486400" cy="3600450"/>
+          </a:xfrm>
+          <a:prstGeom prst="rect">
+            <a:avLst/>
+          </a:prstGeom>
+        </p:spPr>
+        <p:txBody>
+          <a:bodyPr vert="horz" lIns="91440" tIns="45720" rIns="91440" bIns="45720" rtlCol="0"/>
+          <a:lstStyle/>
+          <a:p>
+            <a:pPr lvl="0"/>
+            <a:r>
+              <a:rPr lang="en-US"/>
+              <a:t>Click to edit Master text styles</a:t>
+            </a:r>
+          </a:p>
+          <a:p>
+            <a:pPr lvl="1"/>
+            <a:r>
+              <a:rPr lang="en-US"/>
+              <a:t>Second level</a:t>
+            </a:r>
+          </a:p>
+          <a:p>
+            <a:pPr lvl="2"/>
+            <a:r>
+              <a:rPr lang="en-US"/>
+              <a:t>Third level</a:t>
+            </a:r>
+          </a:p>
+          <a:p>
+            <a:pPr lvl="3"/>
+            <a:r>
+              <a:rPr lang="en-US"/>
+              <a:t>Fourth level</a:t>
+            </a:r>
+          </a:p>
+          <a:p>
+            <a:pPr lvl="4"/>
+            <a:r>
+              <a:rPr lang="en-US"/>
+              <a:t>Fifth level</a:t>
+            </a:r>
+          </a:p>
+        </p:txBody>
+      </p:sp>
+      <p:sp>
+        <p:nvSpPr>
+          <p:cNvPr id="6" name="Footer Placeholder 5"/>
+          <p:cNvSpPr>
+            <a:spLocks noGrp="1"/>
+          </p:cNvSpPr>
+          <p:nvPr>
+            <p:ph type="ftr" sz="quarter" idx="4"/>
+          </p:nvPr>
+        </p:nvSpPr>
+        <p:spPr>
+          <a:xfrm>
+            <a:off x="0" y="8685213"/>
+            <a:ext cx="2971800" cy="458787"/>
+          </a:xfrm>
+          <a:prstGeom prst="rect">
+            <a:avLst/>
+          </a:prstGeom>
+        </p:spPr>
+        <p:txBody>
+          <a:bodyPr vert="horz" lIns="91440" tIns="45720" rIns="91440" bIns="45720" rtlCol="0" anchor="b"/>
+          <a:lstStyle>
+            <a:lvl1pPr algn="l">
+              <a:defRPr sz="1200"/>
+            </a:lvl1pPr>
+          </a:lstStyle>
+          <a:p>
+            <a:endParaRPr lang="en-US"/>
+          </a:p>
+        </p:txBody>
+      </p:sp>
+      <p:sp>
+        <p:nvSpPr>
+          <p:cNvPr id="7" name="Slide Number Placeholder 6"/>
+          <p:cNvSpPr>
+            <a:spLocks noGrp="1"/>
+          </p:cNvSpPr>
+          <p:nvPr>
+            <p:ph type="sldNum" sz="quarter" idx="5"/>
+          </p:nvPr>
+        </p:nvSpPr>
+        <p:spPr>
+          <a:xfrm>
+            <a:off x="3884613" y="8685213"/>
+            <a:ext cx="2971800" cy="458787"/>
+          </a:xfrm>
+          <a:prstGeom prst="rect">
+            <a:avLst/>
+          </a:prstGeom>
+        </p:spPr>
+        <p:txBody>
+          <a:bodyPr vert="horz" lIns="91440" tIns="45720" rIns="91440" bIns="45720" rtlCol="0" anchor="b"/>
+          <a:lstStyle>
+            <a:lvl1pPr algn="r">
+              <a:defRPr sz="1200"/>
+            </a:lvl1pPr>
+          </a:lstStyle>
+          <a:p>
+            <a:fld id="{44B62CCC-73C9-EA42-8BD2-EDAD24BBFB3F}" type="slidenum">
+              <a:rPr lang="en-US" smtClean="0"/>
+              <a:t>‹#›</a:t>
+            </a:fld>
+            <a:endParaRPr lang="en-US"/>
+          </a:p>
+        </p:txBody>
+      </p:sp>
+    </p:spTree>
+    <p:extLst>
+      <p:ext uri="{BB962C8B-B14F-4D97-AF65-F5344CB8AC3E}">
+        <p14:creationId xmlns:p14="http://schemas.microsoft.com/office/powerpoint/2010/main" val="2131544467"/>
+      </p:ext>
+    </p:extLst>
+  </p:cSld>
+  <p:clrMap bg1="lt1" tx1="dk1" bg2="lt2" tx2="dk2" accent1="accent1" accent2="accent2" accent3="accent3" accent4="accent4" accent5="accent5" accent6="accent6" hlink="hlink" folHlink="folHlink"/>
+  <p:notesStyle>
+    <a:lvl1pPr marL="0" algn="l" defTabSz="914400" rtl="0" eaLnBrk="1" latinLnBrk="0" hangingPunct="1">
+      <a:defRPr sz="1200" kern="1200">
+        <a:solidFill>
+          <a:schemeClr val="tx1"/>
+        </a:solidFill>
+        <a:latin typeface="+mn-lt"/>
+        <a:ea typeface="+mn-ea"/>
+        <a:cs typeface="+mn-cs"/>
+      </a:defRPr>
+    </a:lvl1pPr>
+    <a:lvl2pPr marL="457200" algn="l" defTabSz="914400" rtl="0" eaLnBrk="1" latinLnBrk="0" hangingPunct="1">
+      <a:defRPr sz="1200" kern="1200">
+        <a:solidFill>
+          <a:schemeClr val="tx1"/>
+        </a:solidFill>
+        <a:latin typeface="+mn-lt"/>
+        <a:ea typeface="+mn-ea"/>
+        <a:cs typeface="+mn-cs"/>
+      </a:defRPr>
+    </a:lvl2pPr>
+    <a:lvl3pPr marL="914400" algn="l" defTabSz="914400" rtl="0" eaLnBrk="1" latinLnBrk="0" hangingPunct="1">
+      <a:defRPr sz="1200" kern="1200">
+        <a:solidFill>
+          <a:schemeClr val="tx1"/>
+        </a:solidFill>
+        <a:latin typeface="+mn-lt"/>
+        <a:ea typeface="+mn-ea"/>
+        <a:cs typeface="+mn-cs"/>
+      </a:defRPr>
+    </a:lvl3pPr>
+    <a:lvl4pPr marL="1371600" algn="l" defTabSz="914400" rtl="0" eaLnBrk="1" latinLnBrk="0" hangingPunct="1">
+      <a:defRPr sz="1200" kern="1200">
+        <a:solidFill>
+          <a:schemeClr val="tx1"/>
+        </a:solidFill>
+        <a:latin typeface="+mn-lt"/>
+        <a:ea typeface="+mn-ea"/>
+        <a:cs typeface="+mn-cs"/>
+      </a:defRPr>
+    </a:lvl4pPr>
+    <a:lvl5pPr marL="1828800" algn="l" defTabSz="914400" rtl="0" eaLnBrk="1" latinLnBrk="0" hangingPunct="1">
+      <a:defRPr sz="1200" kern="1200">
+        <a:solidFill>
+          <a:schemeClr val="tx1"/>
+        </a:solidFill>
+        <a:latin typeface="+mn-lt"/>
+        <a:ea typeface="+mn-ea"/>
+        <a:cs typeface="+mn-cs"/>
+      </a:defRPr>
+    </a:lvl5pPr>
+    <a:lvl6pPr marL="2286000" algn="l" defTabSz="914400" rtl="0" eaLnBrk="1" latinLnBrk="0" hangingPunct="1">
+      <a:defRPr sz="1200" kern="1200">
+        <a:solidFill>
+          <a:schemeClr val="tx1"/>
+        </a:solidFill>
+        <a:latin typeface="+mn-lt"/>
+        <a:ea typeface="+mn-ea"/>
+        <a:cs typeface="+mn-cs"/>
+      </a:defRPr>
+    </a:lvl6pPr>
+    <a:lvl7pPr marL="2743200" algn="l" defTabSz="914400" rtl="0" eaLnBrk="1" latinLnBrk="0" hangingPunct="1">
+      <a:defRPr sz="1200" kern="1200">
+        <a:solidFill>
+          <a:schemeClr val="tx1"/>
+        </a:solidFill>
+        <a:latin typeface="+mn-lt"/>
+        <a:ea typeface="+mn-ea"/>
+        <a:cs typeface="+mn-cs"/>
+      </a:defRPr>
+    </a:lvl7pPr>
+    <a:lvl8pPr marL="3200400" algn="l" defTabSz="914400" rtl="0" eaLnBrk="1" latinLnBrk="0" hangingPunct="1">
+      <a:defRPr sz="1200" kern="1200">
+        <a:solidFill>
+          <a:schemeClr val="tx1"/>
+        </a:solidFill>
+        <a:latin typeface="+mn-lt"/>
+        <a:ea typeface="+mn-ea"/>
+        <a:cs typeface="+mn-cs"/>
+      </a:defRPr>
+    </a:lvl8pPr>
+    <a:lvl9pPr marL="3657600" algn="l" defTabSz="914400" rtl="0" eaLnBrk="1" latinLnBrk="0" hangingPunct="1">
+      <a:defRPr sz="1200" kern="1200">
+        <a:solidFill>
+          <a:schemeClr val="tx1"/>
+        </a:solidFill>
+        <a:latin typeface="+mn-lt"/>
+        <a:ea typeface="+mn-ea"/>
+        <a:cs typeface="+mn-cs"/>
+      </a:defRPr>
+    </a:lvl9pPr>
+  </p:notesStyle>
+</p:notesMaster>
+</file>
+
+<file path=ppt/notesSlides/notesSlide1.xml><?xml version="1.0" encoding="utf-8"?>
+<p:notes xmlns:a="http://schemas.openxmlformats.org/drawingml/2006/main" xmlns:r="http://schemas.openxmlformats.org/officeDocument/2006/relationships" xmlns:p="http://schemas.openxmlformats.org/presentationml/2006/main">
+  <p:cSld>
+    <p:spTree>
+      <p:nvGrpSpPr>
+        <p:cNvPr id="1" name=""/>
+        <p:cNvGrpSpPr/>
+        <p:nvPr/>
+      </p:nvGrpSpPr>
+      <p:grpSpPr>
+        <a:xfrm>
+          <a:off x="0" y="0"/>
+          <a:ext cx="0" cy="0"/>
+          <a:chOff x="0" y="0"/>
+          <a:chExt cx="0" cy="0"/>
+        </a:xfrm>
+      </p:grpSpPr>
+      <p:sp>
+        <p:nvSpPr>
+          <p:cNvPr id="2" name="Slide Image Placeholder 1"/>
+          <p:cNvSpPr>
+            <a:spLocks noGrp="1" noRot="1" noChangeAspect="1"/>
+          </p:cNvSpPr>
+          <p:nvPr>
+            <p:ph type="sldImg"/>
+          </p:nvPr>
+        </p:nvSpPr>
+        <p:spPr/>
+      </p:sp>
+      <p:sp>
+        <p:nvSpPr>
+          <p:cNvPr id="3" name="Notes Placeholder 2"/>
+          <p:cNvSpPr>
+            <a:spLocks noGrp="1"/>
+          </p:cNvSpPr>
+          <p:nvPr>
+            <p:ph type="body" idx="1"/>
+          </p:nvPr>
+        </p:nvSpPr>
+        <p:spPr/>
+        <p:txBody>
+          <a:bodyPr/>
+          <a:lstStyle/>
+          <a:p>
+            <a:endParaRPr lang="en-US" dirty="0"/>
+          </a:p>
+        </p:txBody>
+      </p:sp>
+      <p:sp>
+        <p:nvSpPr>
+          <p:cNvPr id="4" name="Slide Number Placeholder 3"/>
+          <p:cNvSpPr>
+            <a:spLocks noGrp="1"/>
+          </p:cNvSpPr>
+          <p:nvPr>
+            <p:ph type="sldNum" sz="quarter" idx="5"/>
+          </p:nvPr>
+        </p:nvSpPr>
+        <p:spPr/>
+        <p:txBody>
+          <a:bodyPr/>
+          <a:lstStyle/>
+          <a:p>
+            <a:fld id="{44B62CCC-73C9-EA42-8BD2-EDAD24BBFB3F}" type="slidenum">
+              <a:rPr lang="en-US" smtClean="0"/>
+              <a:t>1</a:t>
+            </a:fld>
+            <a:endParaRPr lang="en-US"/>
+          </a:p>
+        </p:txBody>
+      </p:sp>
+    </p:spTree>
+    <p:extLst>
+      <p:ext uri="{BB962C8B-B14F-4D97-AF65-F5344CB8AC3E}">
+        <p14:creationId xmlns:p14="http://schemas.microsoft.com/office/powerpoint/2010/main" val="1666358143"/>
+      </p:ext>
+    </p:extLst>
+  </p:cSld>
+  <p:clrMapOvr>
+    <a:masterClrMapping/>
+  </p:clrMapOvr>
+</p:notes>
+</file>
+
+<file path=ppt/notesSlides/notesSlide2.xml><?xml version="1.0" encoding="utf-8"?>
+<p:notes xmlns:a="http://schemas.openxmlformats.org/drawingml/2006/main" xmlns:r="http://schemas.openxmlformats.org/officeDocument/2006/relationships" xmlns:p="http://schemas.openxmlformats.org/presentationml/2006/main">
+  <p:cSld>
+    <p:spTree>
+      <p:nvGrpSpPr>
+        <p:cNvPr id="1" name=""/>
+        <p:cNvGrpSpPr/>
+        <p:nvPr/>
+      </p:nvGrpSpPr>
+      <p:grpSpPr>
+        <a:xfrm>
+          <a:off x="0" y="0"/>
+          <a:ext cx="0" cy="0"/>
+          <a:chOff x="0" y="0"/>
+          <a:chExt cx="0" cy="0"/>
+        </a:xfrm>
+      </p:grpSpPr>
+      <p:sp>
+        <p:nvSpPr>
+          <p:cNvPr id="2" name="Slide Image Placeholder 1"/>
+          <p:cNvSpPr>
+            <a:spLocks noGrp="1" noRot="1" noChangeAspect="1"/>
+          </p:cNvSpPr>
+          <p:nvPr>
+            <p:ph type="sldImg"/>
+          </p:nvPr>
+        </p:nvSpPr>
+        <p:spPr/>
+      </p:sp>
+      <p:sp>
+        <p:nvSpPr>
+          <p:cNvPr id="3" name="Notes Placeholder 2"/>
+          <p:cNvSpPr>
+            <a:spLocks noGrp="1"/>
+          </p:cNvSpPr>
+          <p:nvPr>
+            <p:ph type="body" idx="1"/>
+          </p:nvPr>
+        </p:nvSpPr>
+        <p:spPr/>
+        <p:txBody>
+          <a:bodyPr/>
+          <a:lstStyle/>
+          <a:p>
+            <a:r>
+              <a:rPr lang="en-US" dirty="0"/>
+              <a:t>To increase the stability of the prediction and see if we can increase the number of predicted </a:t>
+            </a:r>
+            <a:r>
+              <a:rPr lang="en-US" dirty="0" err="1"/>
+              <a:t>Fis</a:t>
+            </a:r>
+            <a:r>
+              <a:rPr lang="en-US" dirty="0"/>
+              <a:t>, we replaced the current Naive-</a:t>
+            </a:r>
+            <a:r>
+              <a:rPr lang="en-US" dirty="0" err="1"/>
+              <a:t>bayesian</a:t>
+            </a:r>
+            <a:r>
+              <a:rPr lang="en-US" dirty="0"/>
+              <a:t> classifier based workflow with this new one we developed for the Reactome IDG portal project, which I will talk a little bit more later.  In this new pipeline, we extended protein pairwise features from 9 to 106 protein/gene pairwise relationship features, including tissue and cancer specific gene co-expressions, gene similarity data from </a:t>
+            </a:r>
+            <a:r>
+              <a:rPr lang="en-US" dirty="0" err="1"/>
+              <a:t>Harmonizome</a:t>
+            </a:r>
+            <a:r>
+              <a:rPr lang="en-US" dirty="0"/>
+              <a:t>, protein-protein </a:t>
+            </a:r>
+            <a:r>
+              <a:rPr lang="en-US" dirty="0" err="1"/>
+              <a:t>ineraction</a:t>
+            </a:r>
+            <a:r>
+              <a:rPr lang="en-US" dirty="0"/>
+              <a:t> datasets from </a:t>
+            </a:r>
+            <a:r>
+              <a:rPr lang="en-US" dirty="0" err="1"/>
+              <a:t>StringDB</a:t>
+            </a:r>
+            <a:r>
+              <a:rPr lang="en-US" dirty="0"/>
+              <a:t>, </a:t>
+            </a:r>
+            <a:r>
+              <a:rPr lang="en-US" dirty="0" err="1"/>
+              <a:t>BioGrid</a:t>
+            </a:r>
+            <a:r>
+              <a:rPr lang="en-US" dirty="0"/>
+              <a:t>, and </a:t>
+            </a:r>
+            <a:r>
+              <a:rPr lang="en-US" dirty="0" err="1"/>
+              <a:t>BioPlex</a:t>
+            </a:r>
+            <a:r>
+              <a:rPr lang="en-US" dirty="0"/>
+              <a:t>, protein domain-domain interaction, and GO biological process annotation. Using the extracted </a:t>
+            </a:r>
+            <a:r>
+              <a:rPr lang="en-US" dirty="0" err="1"/>
+              <a:t>Fis</a:t>
+            </a:r>
+            <a:r>
+              <a:rPr lang="en-US" dirty="0"/>
+              <a:t> from Reactome to measure the performance, we got AUC 0.89, which is quite good. Though we are not exactly sure yet, however, we may expect to see more stable predicted results with these many features. </a:t>
+            </a:r>
+          </a:p>
+        </p:txBody>
+      </p:sp>
+      <p:sp>
+        <p:nvSpPr>
+          <p:cNvPr id="4" name="Slide Number Placeholder 3"/>
+          <p:cNvSpPr>
+            <a:spLocks noGrp="1"/>
+          </p:cNvSpPr>
+          <p:nvPr>
+            <p:ph type="sldNum" sz="quarter" idx="5"/>
+          </p:nvPr>
+        </p:nvSpPr>
+        <p:spPr/>
+        <p:txBody>
+          <a:bodyPr/>
+          <a:lstStyle/>
+          <a:p>
+            <a:pPr>
+              <a:defRPr/>
+            </a:pPr>
+            <a:fld id="{29CFA5EB-8C47-3B41-8231-2967036D931B}" type="slidenum">
+              <a:rPr lang="en-US" smtClean="0"/>
+              <a:pPr>
+                <a:defRPr/>
+              </a:pPr>
+              <a:t>2</a:t>
+            </a:fld>
+            <a:endParaRPr lang="en-US"/>
+          </a:p>
+        </p:txBody>
+      </p:sp>
+    </p:spTree>
+    <p:extLst>
+      <p:ext uri="{BB962C8B-B14F-4D97-AF65-F5344CB8AC3E}">
+        <p14:creationId xmlns:p14="http://schemas.microsoft.com/office/powerpoint/2010/main" val="1360277977"/>
+      </p:ext>
+    </p:extLst>
+  </p:cSld>
+  <p:clrMapOvr>
+    <a:masterClrMapping/>
+  </p:clrMapOvr>
+</p:notes>
 </file>
 
 <file path=ppt/slideLayouts/slideLayout1.xml><?xml version="1.0" encoding="utf-8"?>
@@ -145,10 +755,9 @@
           <a:lstStyle/>
           <a:p>
             <a:r>
-              <a:rPr lang="en-US" smtClean="0"/>
+              <a:rPr lang="en-US"/>
               <a:t>Click to edit Master title style</a:t>
             </a:r>
-            <a:endParaRPr lang="en-US"/>
           </a:p>
         </p:txBody>
       </p:sp>
@@ -264,10 +873,9 @@
           </a:lstStyle>
           <a:p>
             <a:r>
-              <a:rPr lang="en-US" smtClean="0"/>
+              <a:rPr lang="en-US"/>
               <a:t>Click to edit Master subtitle style</a:t>
             </a:r>
-            <a:endParaRPr lang="en-US"/>
           </a:p>
         </p:txBody>
       </p:sp>
@@ -288,7 +896,7 @@
           <a:p>
             <a:fld id="{BD359BB1-992F-D24C-A539-F1AEC9179E2A}" type="datetimeFigureOut">
               <a:rPr lang="en-US" smtClean="0"/>
-              <a:t>12/15/14</a:t>
+              <a:t>4/15/24</a:t>
             </a:fld>
             <a:endParaRPr lang="en-US"/>
           </a:p>
@@ -382,10 +990,9 @@
           <a:lstStyle/>
           <a:p>
             <a:r>
-              <a:rPr lang="en-US" smtClean="0"/>
+              <a:rPr lang="en-US"/>
               <a:t>Click to edit Master title style</a:t>
             </a:r>
-            <a:endParaRPr lang="en-US"/>
           </a:p>
         </p:txBody>
       </p:sp>
@@ -406,38 +1013,37 @@
           <a:p>
             <a:pPr lvl="0"/>
             <a:r>
-              <a:rPr lang="en-US" smtClean="0"/>
+              <a:rPr lang="en-US"/>
               <a:t>Click to edit Master text styles</a:t>
             </a:r>
           </a:p>
           <a:p>
             <a:pPr lvl="1"/>
             <a:r>
-              <a:rPr lang="en-US" smtClean="0"/>
+              <a:rPr lang="en-US"/>
               <a:t>Second level</a:t>
             </a:r>
           </a:p>
           <a:p>
             <a:pPr lvl="2"/>
             <a:r>
-              <a:rPr lang="en-US" smtClean="0"/>
+              <a:rPr lang="en-US"/>
               <a:t>Third level</a:t>
             </a:r>
           </a:p>
           <a:p>
             <a:pPr lvl="3"/>
             <a:r>
-              <a:rPr lang="en-US" smtClean="0"/>
+              <a:rPr lang="en-US"/>
               <a:t>Fourth level</a:t>
             </a:r>
           </a:p>
           <a:p>
             <a:pPr lvl="4"/>
             <a:r>
-              <a:rPr lang="en-US" smtClean="0"/>
+              <a:rPr lang="en-US"/>
               <a:t>Fifth level</a:t>
             </a:r>
-            <a:endParaRPr lang="en-US"/>
           </a:p>
         </p:txBody>
       </p:sp>
@@ -458,7 +1064,7 @@
           <a:p>
             <a:fld id="{BD359BB1-992F-D24C-A539-F1AEC9179E2A}" type="datetimeFigureOut">
               <a:rPr lang="en-US" smtClean="0"/>
-              <a:t>12/15/14</a:t>
+              <a:t>4/15/24</a:t>
             </a:fld>
             <a:endParaRPr lang="en-US"/>
           </a:p>
@@ -557,10 +1163,9 @@
           <a:lstStyle/>
           <a:p>
             <a:r>
-              <a:rPr lang="en-US" smtClean="0"/>
+              <a:rPr lang="en-US"/>
               <a:t>Click to edit Master title style</a:t>
             </a:r>
-            <a:endParaRPr lang="en-US"/>
           </a:p>
         </p:txBody>
       </p:sp>
@@ -586,38 +1191,37 @@
           <a:p>
             <a:pPr lvl="0"/>
             <a:r>
-              <a:rPr lang="en-US" smtClean="0"/>
+              <a:rPr lang="en-US"/>
               <a:t>Click to edit Master text styles</a:t>
             </a:r>
           </a:p>
           <a:p>
             <a:pPr lvl="1"/>
             <a:r>
-              <a:rPr lang="en-US" smtClean="0"/>
+              <a:rPr lang="en-US"/>
               <a:t>Second level</a:t>
             </a:r>
           </a:p>
           <a:p>
             <a:pPr lvl="2"/>
             <a:r>
-              <a:rPr lang="en-US" smtClean="0"/>
+              <a:rPr lang="en-US"/>
               <a:t>Third level</a:t>
             </a:r>
           </a:p>
           <a:p>
             <a:pPr lvl="3"/>
             <a:r>
-              <a:rPr lang="en-US" smtClean="0"/>
+              <a:rPr lang="en-US"/>
               <a:t>Fourth level</a:t>
             </a:r>
           </a:p>
           <a:p>
             <a:pPr lvl="4"/>
             <a:r>
-              <a:rPr lang="en-US" smtClean="0"/>
+              <a:rPr lang="en-US"/>
               <a:t>Fifth level</a:t>
             </a:r>
-            <a:endParaRPr lang="en-US"/>
           </a:p>
         </p:txBody>
       </p:sp>
@@ -638,7 +1242,7 @@
           <a:p>
             <a:fld id="{BD359BB1-992F-D24C-A539-F1AEC9179E2A}" type="datetimeFigureOut">
               <a:rPr lang="en-US" smtClean="0"/>
-              <a:t>12/15/14</a:t>
+              <a:t>4/15/24</a:t>
             </a:fld>
             <a:endParaRPr lang="en-US"/>
           </a:p>
@@ -732,10 +1336,9 @@
           <a:lstStyle/>
           <a:p>
             <a:r>
-              <a:rPr lang="en-US" smtClean="0"/>
+              <a:rPr lang="en-US"/>
               <a:t>Click to edit Master title style</a:t>
             </a:r>
-            <a:endParaRPr lang="en-US"/>
           </a:p>
         </p:txBody>
       </p:sp>
@@ -756,38 +1359,37 @@
           <a:p>
             <a:pPr lvl="0"/>
             <a:r>
-              <a:rPr lang="en-US" smtClean="0"/>
+              <a:rPr lang="en-US"/>
               <a:t>Click to edit Master text styles</a:t>
             </a:r>
           </a:p>
           <a:p>
             <a:pPr lvl="1"/>
             <a:r>
-              <a:rPr lang="en-US" smtClean="0"/>
+              <a:rPr lang="en-US"/>
               <a:t>Second level</a:t>
             </a:r>
           </a:p>
           <a:p>
             <a:pPr lvl="2"/>
             <a:r>
-              <a:rPr lang="en-US" smtClean="0"/>
+              <a:rPr lang="en-US"/>
               <a:t>Third level</a:t>
             </a:r>
           </a:p>
           <a:p>
             <a:pPr lvl="3"/>
             <a:r>
-              <a:rPr lang="en-US" smtClean="0"/>
+              <a:rPr lang="en-US"/>
               <a:t>Fourth level</a:t>
             </a:r>
           </a:p>
           <a:p>
             <a:pPr lvl="4"/>
             <a:r>
-              <a:rPr lang="en-US" smtClean="0"/>
+              <a:rPr lang="en-US"/>
               <a:t>Fifth level</a:t>
             </a:r>
-            <a:endParaRPr lang="en-US"/>
           </a:p>
         </p:txBody>
       </p:sp>
@@ -808,7 +1410,7 @@
           <a:p>
             <a:fld id="{BD359BB1-992F-D24C-A539-F1AEC9179E2A}" type="datetimeFigureOut">
               <a:rPr lang="en-US" smtClean="0"/>
-              <a:t>12/15/14</a:t>
+              <a:t>4/15/24</a:t>
             </a:fld>
             <a:endParaRPr lang="en-US"/>
           </a:p>
@@ -911,10 +1513,9 @@
           </a:lstStyle>
           <a:p>
             <a:r>
-              <a:rPr lang="en-US" smtClean="0"/>
+              <a:rPr lang="en-US"/>
               <a:t>Click to edit Master title style</a:t>
             </a:r>
-            <a:endParaRPr lang="en-US"/>
           </a:p>
         </p:txBody>
       </p:sp>
@@ -1031,7 +1632,7 @@
           <a:p>
             <a:pPr lvl="0"/>
             <a:r>
-              <a:rPr lang="en-US" smtClean="0"/>
+              <a:rPr lang="en-US"/>
               <a:t>Click to edit Master text styles</a:t>
             </a:r>
           </a:p>
@@ -1054,7 +1655,7 @@
           <a:p>
             <a:fld id="{BD359BB1-992F-D24C-A539-F1AEC9179E2A}" type="datetimeFigureOut">
               <a:rPr lang="en-US" smtClean="0"/>
-              <a:t>12/15/14</a:t>
+              <a:t>4/15/24</a:t>
             </a:fld>
             <a:endParaRPr lang="en-US"/>
           </a:p>
@@ -1148,10 +1749,9 @@
           <a:lstStyle/>
           <a:p>
             <a:r>
-              <a:rPr lang="en-US" smtClean="0"/>
+              <a:rPr lang="en-US"/>
               <a:t>Click to edit Master title style</a:t>
             </a:r>
-            <a:endParaRPr lang="en-US"/>
           </a:p>
         </p:txBody>
       </p:sp>
@@ -1205,38 +1805,37 @@
           <a:p>
             <a:pPr lvl="0"/>
             <a:r>
-              <a:rPr lang="en-US" smtClean="0"/>
+              <a:rPr lang="en-US"/>
               <a:t>Click to edit Master text styles</a:t>
             </a:r>
           </a:p>
           <a:p>
             <a:pPr lvl="1"/>
             <a:r>
-              <a:rPr lang="en-US" smtClean="0"/>
+              <a:rPr lang="en-US"/>
               <a:t>Second level</a:t>
             </a:r>
           </a:p>
           <a:p>
             <a:pPr lvl="2"/>
             <a:r>
-              <a:rPr lang="en-US" smtClean="0"/>
+              <a:rPr lang="en-US"/>
               <a:t>Third level</a:t>
             </a:r>
           </a:p>
           <a:p>
             <a:pPr lvl="3"/>
             <a:r>
-              <a:rPr lang="en-US" smtClean="0"/>
+              <a:rPr lang="en-US"/>
               <a:t>Fourth level</a:t>
             </a:r>
           </a:p>
           <a:p>
             <a:pPr lvl="4"/>
             <a:r>
-              <a:rPr lang="en-US" smtClean="0"/>
+              <a:rPr lang="en-US"/>
               <a:t>Fifth level</a:t>
             </a:r>
-            <a:endParaRPr lang="en-US"/>
           </a:p>
         </p:txBody>
       </p:sp>
@@ -1290,38 +1889,37 @@
           <a:p>
             <a:pPr lvl="0"/>
             <a:r>
-              <a:rPr lang="en-US" smtClean="0"/>
+              <a:rPr lang="en-US"/>
               <a:t>Click to edit Master text styles</a:t>
             </a:r>
           </a:p>
           <a:p>
             <a:pPr lvl="1"/>
             <a:r>
-              <a:rPr lang="en-US" smtClean="0"/>
+              <a:rPr lang="en-US"/>
               <a:t>Second level</a:t>
             </a:r>
           </a:p>
           <a:p>
             <a:pPr lvl="2"/>
             <a:r>
-              <a:rPr lang="en-US" smtClean="0"/>
+              <a:rPr lang="en-US"/>
               <a:t>Third level</a:t>
             </a:r>
           </a:p>
           <a:p>
             <a:pPr lvl="3"/>
             <a:r>
-              <a:rPr lang="en-US" smtClean="0"/>
+              <a:rPr lang="en-US"/>
               <a:t>Fourth level</a:t>
             </a:r>
           </a:p>
           <a:p>
             <a:pPr lvl="4"/>
             <a:r>
-              <a:rPr lang="en-US" smtClean="0"/>
+              <a:rPr lang="en-US"/>
               <a:t>Fifth level</a:t>
             </a:r>
-            <a:endParaRPr lang="en-US"/>
           </a:p>
         </p:txBody>
       </p:sp>
@@ -1342,7 +1940,7 @@
           <a:p>
             <a:fld id="{BD359BB1-992F-D24C-A539-F1AEC9179E2A}" type="datetimeFigureOut">
               <a:rPr lang="en-US" smtClean="0"/>
-              <a:t>12/15/14</a:t>
+              <a:t>4/15/24</a:t>
             </a:fld>
             <a:endParaRPr lang="en-US"/>
           </a:p>
@@ -1440,10 +2038,9 @@
           </a:lstStyle>
           <a:p>
             <a:r>
-              <a:rPr lang="en-US" smtClean="0"/>
+              <a:rPr lang="en-US"/>
               <a:t>Click to edit Master title style</a:t>
             </a:r>
-            <a:endParaRPr lang="en-US"/>
           </a:p>
         </p:txBody>
       </p:sp>
@@ -1506,7 +2103,7 @@
           <a:p>
             <a:pPr lvl="0"/>
             <a:r>
-              <a:rPr lang="en-US" smtClean="0"/>
+              <a:rPr lang="en-US"/>
               <a:t>Click to edit Master text styles</a:t>
             </a:r>
           </a:p>
@@ -1562,38 +2159,37 @@
           <a:p>
             <a:pPr lvl="0"/>
             <a:r>
-              <a:rPr lang="en-US" smtClean="0"/>
+              <a:rPr lang="en-US"/>
               <a:t>Click to edit Master text styles</a:t>
             </a:r>
           </a:p>
           <a:p>
             <a:pPr lvl="1"/>
             <a:r>
-              <a:rPr lang="en-US" smtClean="0"/>
+              <a:rPr lang="en-US"/>
               <a:t>Second level</a:t>
             </a:r>
           </a:p>
           <a:p>
             <a:pPr lvl="2"/>
             <a:r>
-              <a:rPr lang="en-US" smtClean="0"/>
+              <a:rPr lang="en-US"/>
               <a:t>Third level</a:t>
             </a:r>
           </a:p>
           <a:p>
             <a:pPr lvl="3"/>
             <a:r>
-              <a:rPr lang="en-US" smtClean="0"/>
+              <a:rPr lang="en-US"/>
               <a:t>Fourth level</a:t>
             </a:r>
           </a:p>
           <a:p>
             <a:pPr lvl="4"/>
             <a:r>
-              <a:rPr lang="en-US" smtClean="0"/>
+              <a:rPr lang="en-US"/>
               <a:t>Fifth level</a:t>
             </a:r>
-            <a:endParaRPr lang="en-US"/>
           </a:p>
         </p:txBody>
       </p:sp>
@@ -1656,7 +2252,7 @@
           <a:p>
             <a:pPr lvl="0"/>
             <a:r>
-              <a:rPr lang="en-US" smtClean="0"/>
+              <a:rPr lang="en-US"/>
               <a:t>Click to edit Master text styles</a:t>
             </a:r>
           </a:p>
@@ -1712,38 +2308,37 @@
           <a:p>
             <a:pPr lvl="0"/>
             <a:r>
-              <a:rPr lang="en-US" smtClean="0"/>
+              <a:rPr lang="en-US"/>
               <a:t>Click to edit Master text styles</a:t>
             </a:r>
           </a:p>
           <a:p>
             <a:pPr lvl="1"/>
             <a:r>
-              <a:rPr lang="en-US" smtClean="0"/>
+              <a:rPr lang="en-US"/>
               <a:t>Second level</a:t>
             </a:r>
           </a:p>
           <a:p>
             <a:pPr lvl="2"/>
             <a:r>
-              <a:rPr lang="en-US" smtClean="0"/>
+              <a:rPr lang="en-US"/>
               <a:t>Third level</a:t>
             </a:r>
           </a:p>
           <a:p>
             <a:pPr lvl="3"/>
             <a:r>
-              <a:rPr lang="en-US" smtClean="0"/>
+              <a:rPr lang="en-US"/>
               <a:t>Fourth level</a:t>
             </a:r>
           </a:p>
           <a:p>
             <a:pPr lvl="4"/>
             <a:r>
-              <a:rPr lang="en-US" smtClean="0"/>
+              <a:rPr lang="en-US"/>
               <a:t>Fifth level</a:t>
             </a:r>
-            <a:endParaRPr lang="en-US"/>
           </a:p>
         </p:txBody>
       </p:sp>
@@ -1764,7 +2359,7 @@
           <a:p>
             <a:fld id="{BD359BB1-992F-D24C-A539-F1AEC9179E2A}" type="datetimeFigureOut">
               <a:rPr lang="en-US" smtClean="0"/>
-              <a:t>12/15/14</a:t>
+              <a:t>4/15/24</a:t>
             </a:fld>
             <a:endParaRPr lang="en-US"/>
           </a:p>
@@ -1858,10 +2453,9 @@
           <a:lstStyle/>
           <a:p>
             <a:r>
-              <a:rPr lang="en-US" smtClean="0"/>
+              <a:rPr lang="en-US"/>
               <a:t>Click to edit Master title style</a:t>
             </a:r>
-            <a:endParaRPr lang="en-US"/>
           </a:p>
         </p:txBody>
       </p:sp>
@@ -1882,7 +2476,7 @@
           <a:p>
             <a:fld id="{BD359BB1-992F-D24C-A539-F1AEC9179E2A}" type="datetimeFigureOut">
               <a:rPr lang="en-US" smtClean="0"/>
-              <a:t>12/15/14</a:t>
+              <a:t>4/15/24</a:t>
             </a:fld>
             <a:endParaRPr lang="en-US"/>
           </a:p>
@@ -1977,7 +2571,7 @@
           <a:p>
             <a:fld id="{BD359BB1-992F-D24C-A539-F1AEC9179E2A}" type="datetimeFigureOut">
               <a:rPr lang="en-US" smtClean="0"/>
-              <a:t>12/15/14</a:t>
+              <a:t>4/15/24</a:t>
             </a:fld>
             <a:endParaRPr lang="en-US"/>
           </a:p>
@@ -2080,10 +2674,9 @@
           </a:lstStyle>
           <a:p>
             <a:r>
-              <a:rPr lang="en-US" smtClean="0"/>
+              <a:rPr lang="en-US"/>
               <a:t>Click to edit Master title style</a:t>
             </a:r>
-            <a:endParaRPr lang="en-US"/>
           </a:p>
         </p:txBody>
       </p:sp>
@@ -2137,38 +2730,37 @@
           <a:p>
             <a:pPr lvl="0"/>
             <a:r>
-              <a:rPr lang="en-US" smtClean="0"/>
+              <a:rPr lang="en-US"/>
               <a:t>Click to edit Master text styles</a:t>
             </a:r>
           </a:p>
           <a:p>
             <a:pPr lvl="1"/>
             <a:r>
-              <a:rPr lang="en-US" smtClean="0"/>
+              <a:rPr lang="en-US"/>
               <a:t>Second level</a:t>
             </a:r>
           </a:p>
           <a:p>
             <a:pPr lvl="2"/>
             <a:r>
-              <a:rPr lang="en-US" smtClean="0"/>
+              <a:rPr lang="en-US"/>
               <a:t>Third level</a:t>
             </a:r>
           </a:p>
           <a:p>
             <a:pPr lvl="3"/>
             <a:r>
-              <a:rPr lang="en-US" smtClean="0"/>
+              <a:rPr lang="en-US"/>
               <a:t>Fourth level</a:t>
             </a:r>
           </a:p>
           <a:p>
             <a:pPr lvl="4"/>
             <a:r>
-              <a:rPr lang="en-US" smtClean="0"/>
+              <a:rPr lang="en-US"/>
               <a:t>Fifth level</a:t>
             </a:r>
-            <a:endParaRPr lang="en-US"/>
           </a:p>
         </p:txBody>
       </p:sp>
@@ -2231,7 +2823,7 @@
           <a:p>
             <a:pPr lvl="0"/>
             <a:r>
-              <a:rPr lang="en-US" smtClean="0"/>
+              <a:rPr lang="en-US"/>
               <a:t>Click to edit Master text styles</a:t>
             </a:r>
           </a:p>
@@ -2254,7 +2846,7 @@
           <a:p>
             <a:fld id="{BD359BB1-992F-D24C-A539-F1AEC9179E2A}" type="datetimeFigureOut">
               <a:rPr lang="en-US" smtClean="0"/>
-              <a:t>12/15/14</a:t>
+              <a:t>4/15/24</a:t>
             </a:fld>
             <a:endParaRPr lang="en-US"/>
           </a:p>
@@ -2357,10 +2949,9 @@
           </a:lstStyle>
           <a:p>
             <a:r>
-              <a:rPr lang="en-US" smtClean="0"/>
+              <a:rPr lang="en-US"/>
               <a:t>Click to edit Master title style</a:t>
             </a:r>
-            <a:endParaRPr lang="en-US"/>
           </a:p>
         </p:txBody>
       </p:sp>
@@ -2484,7 +3075,7 @@
           <a:p>
             <a:pPr lvl="0"/>
             <a:r>
-              <a:rPr lang="en-US" smtClean="0"/>
+              <a:rPr lang="en-US"/>
               <a:t>Click to edit Master text styles</a:t>
             </a:r>
           </a:p>
@@ -2507,7 +3098,7 @@
           <a:p>
             <a:fld id="{BD359BB1-992F-D24C-A539-F1AEC9179E2A}" type="datetimeFigureOut">
               <a:rPr lang="en-US" smtClean="0"/>
-              <a:t>12/15/14</a:t>
+              <a:t>4/15/24</a:t>
             </a:fld>
             <a:endParaRPr lang="en-US"/>
           </a:p>
@@ -2616,10 +3207,9 @@
           <a:lstStyle/>
           <a:p>
             <a:r>
-              <a:rPr lang="en-US" smtClean="0"/>
+              <a:rPr lang="en-US"/>
               <a:t>Click to edit Master title style</a:t>
             </a:r>
-            <a:endParaRPr lang="en-US"/>
           </a:p>
         </p:txBody>
       </p:sp>
@@ -2650,38 +3240,37 @@
           <a:p>
             <a:pPr lvl="0"/>
             <a:r>
-              <a:rPr lang="en-US" smtClean="0"/>
+              <a:rPr lang="en-US"/>
               <a:t>Click to edit Master text styles</a:t>
             </a:r>
           </a:p>
           <a:p>
             <a:pPr lvl="1"/>
             <a:r>
-              <a:rPr lang="en-US" smtClean="0"/>
+              <a:rPr lang="en-US"/>
               <a:t>Second level</a:t>
             </a:r>
           </a:p>
           <a:p>
             <a:pPr lvl="2"/>
             <a:r>
-              <a:rPr lang="en-US" smtClean="0"/>
+              <a:rPr lang="en-US"/>
               <a:t>Third level</a:t>
             </a:r>
           </a:p>
           <a:p>
             <a:pPr lvl="3"/>
             <a:r>
-              <a:rPr lang="en-US" smtClean="0"/>
+              <a:rPr lang="en-US"/>
               <a:t>Fourth level</a:t>
             </a:r>
           </a:p>
           <a:p>
             <a:pPr lvl="4"/>
             <a:r>
-              <a:rPr lang="en-US" smtClean="0"/>
+              <a:rPr lang="en-US"/>
               <a:t>Fifth level</a:t>
             </a:r>
-            <a:endParaRPr lang="en-US"/>
           </a:p>
         </p:txBody>
       </p:sp>
@@ -2720,7 +3309,7 @@
           <a:p>
             <a:fld id="{BD359BB1-992F-D24C-A539-F1AEC9179E2A}" type="datetimeFigureOut">
               <a:rPr lang="en-US" smtClean="0"/>
-              <a:t>12/15/14</a:t>
+              <a:t>4/15/24</a:t>
             </a:fld>
             <a:endParaRPr lang="en-US"/>
           </a:p>
@@ -3135,7 +3724,7 @@
           <a:p>
             <a:pPr algn="ctr"/>
             <a:r>
-              <a:rPr lang="en-US" sz="1400" dirty="0" smtClean="0">
+              <a:rPr lang="en-US" sz="1400" dirty="0">
                 <a:solidFill>
                   <a:schemeClr val="tx1"/>
                 </a:solidFill>
@@ -3144,13 +3733,6 @@
               </a:rPr>
               <a:t>Human PPI [45-47]</a:t>
             </a:r>
-            <a:endParaRPr lang="en-US" sz="1400" dirty="0">
-              <a:solidFill>
-                <a:schemeClr val="tx1"/>
-              </a:solidFill>
-              <a:latin typeface="Helvetica"/>
-              <a:cs typeface="Helvetica"/>
-            </a:endParaRPr>
           </a:p>
         </p:txBody>
       </p:sp>
@@ -3194,7 +3776,7 @@
           <a:p>
             <a:pPr algn="ctr"/>
             <a:r>
-              <a:rPr lang="en-US" sz="1400" dirty="0" smtClean="0">
+              <a:rPr lang="en-US" sz="1400" dirty="0">
                 <a:solidFill>
                   <a:schemeClr val="tx1"/>
                 </a:solidFill>
@@ -3203,13 +3785,6 @@
               </a:rPr>
               <a:t>Fly PPI [45]</a:t>
             </a:r>
-            <a:endParaRPr lang="en-US" sz="1400" dirty="0">
-              <a:solidFill>
-                <a:schemeClr val="tx1"/>
-              </a:solidFill>
-              <a:latin typeface="Helvetica"/>
-              <a:cs typeface="Helvetica"/>
-            </a:endParaRPr>
           </a:p>
         </p:txBody>
       </p:sp>
@@ -3253,7 +3828,7 @@
           <a:p>
             <a:pPr algn="ctr"/>
             <a:r>
-              <a:rPr lang="en-US" sz="1400" dirty="0" smtClean="0">
+              <a:rPr lang="en-US" sz="1400" dirty="0">
                 <a:solidFill>
                   <a:schemeClr val="tx1"/>
                 </a:solidFill>
@@ -3262,13 +3837,6 @@
               </a:rPr>
               <a:t>Domain Interaction [52]</a:t>
             </a:r>
-            <a:endParaRPr lang="en-US" sz="1400" dirty="0">
-              <a:solidFill>
-                <a:schemeClr val="tx1"/>
-              </a:solidFill>
-              <a:latin typeface="Helvetica"/>
-              <a:cs typeface="Helvetica"/>
-            </a:endParaRPr>
           </a:p>
         </p:txBody>
       </p:sp>
@@ -3312,7 +3880,7 @@
           <a:p>
             <a:pPr algn="ctr"/>
             <a:r>
-              <a:rPr lang="en-US" sz="1400" dirty="0" err="1" smtClean="0">
+              <a:rPr lang="en-US" sz="1400" dirty="0" err="1">
                 <a:solidFill>
                   <a:schemeClr val="tx1"/>
                 </a:solidFill>
@@ -3322,7 +3890,7 @@
               <a:t>Prieto’s</a:t>
             </a:r>
             <a:r>
-              <a:rPr lang="en-US" sz="1400" dirty="0" smtClean="0">
+              <a:rPr lang="en-US" sz="1400" dirty="0">
                 <a:solidFill>
                   <a:schemeClr val="tx1"/>
                 </a:solidFill>
@@ -3331,13 +3899,6 @@
               </a:rPr>
               <a:t> Gene Expression [50]</a:t>
             </a:r>
-            <a:endParaRPr lang="en-US" sz="1400" dirty="0">
-              <a:solidFill>
-                <a:schemeClr val="tx1"/>
-              </a:solidFill>
-              <a:latin typeface="Helvetica"/>
-              <a:cs typeface="Helvetica"/>
-            </a:endParaRPr>
           </a:p>
         </p:txBody>
       </p:sp>
@@ -3381,7 +3942,7 @@
           <a:p>
             <a:pPr algn="ctr"/>
             <a:r>
-              <a:rPr lang="en-US" sz="1400" dirty="0" smtClean="0">
+              <a:rPr lang="en-US" sz="1400" dirty="0">
                 <a:solidFill>
                   <a:schemeClr val="tx1"/>
                 </a:solidFill>
@@ -3390,13 +3951,6 @@
               </a:rPr>
               <a:t>Lee’s Gene Expression [49]</a:t>
             </a:r>
-            <a:endParaRPr lang="en-US" sz="1400" dirty="0">
-              <a:solidFill>
-                <a:schemeClr val="tx1"/>
-              </a:solidFill>
-              <a:latin typeface="Helvetica"/>
-              <a:cs typeface="Helvetica"/>
-            </a:endParaRPr>
           </a:p>
         </p:txBody>
       </p:sp>
@@ -3440,7 +3994,7 @@
           <a:p>
             <a:pPr algn="ctr"/>
             <a:r>
-              <a:rPr lang="en-US" sz="1400" dirty="0" smtClean="0">
+              <a:rPr lang="en-US" sz="1400" dirty="0">
                 <a:solidFill>
                   <a:schemeClr val="tx1"/>
                 </a:solidFill>
@@ -3449,13 +4003,6 @@
               </a:rPr>
               <a:t>GO BP Sharing [51]</a:t>
             </a:r>
-            <a:endParaRPr lang="en-US" sz="1400" dirty="0">
-              <a:solidFill>
-                <a:schemeClr val="tx1"/>
-              </a:solidFill>
-              <a:latin typeface="Helvetica"/>
-              <a:cs typeface="Helvetica"/>
-            </a:endParaRPr>
           </a:p>
         </p:txBody>
       </p:sp>
@@ -3499,7 +4046,7 @@
           <a:p>
             <a:pPr algn="ctr"/>
             <a:r>
-              <a:rPr lang="en-US" sz="1400" dirty="0" smtClean="0">
+              <a:rPr lang="en-US" sz="1400" dirty="0">
                 <a:solidFill>
                   <a:schemeClr val="tx1"/>
                 </a:solidFill>
@@ -3508,13 +4055,6 @@
               </a:rPr>
               <a:t>Yeast PPI [45]</a:t>
             </a:r>
-            <a:endParaRPr lang="en-US" sz="1400" dirty="0">
-              <a:solidFill>
-                <a:schemeClr val="tx1"/>
-              </a:solidFill>
-              <a:latin typeface="Helvetica"/>
-              <a:cs typeface="Helvetica"/>
-            </a:endParaRPr>
           </a:p>
         </p:txBody>
       </p:sp>
@@ -3558,7 +4098,7 @@
           <a:p>
             <a:pPr algn="ctr"/>
             <a:r>
-              <a:rPr lang="en-US" sz="1400" dirty="0" smtClean="0">
+              <a:rPr lang="en-US" sz="1400" dirty="0">
                 <a:solidFill>
                   <a:schemeClr val="tx1"/>
                 </a:solidFill>
@@ -3567,13 +4107,6 @@
               </a:rPr>
               <a:t>Worm PPI [45]</a:t>
             </a:r>
-            <a:endParaRPr lang="en-US" sz="1400" dirty="0">
-              <a:solidFill>
-                <a:schemeClr val="tx1"/>
-              </a:solidFill>
-              <a:latin typeface="Helvetica"/>
-              <a:cs typeface="Helvetica"/>
-            </a:endParaRPr>
           </a:p>
         </p:txBody>
       </p:sp>
@@ -3617,7 +4150,7 @@
           <a:p>
             <a:pPr algn="ctr"/>
             <a:r>
-              <a:rPr lang="en-US" sz="1400" dirty="0" err="1" smtClean="0">
+              <a:rPr lang="en-US" sz="1400" dirty="0" err="1">
                 <a:solidFill>
                   <a:schemeClr val="tx1"/>
                 </a:solidFill>
@@ -3627,7 +4160,7 @@
               <a:t>PPIs</a:t>
             </a:r>
             <a:r>
-              <a:rPr lang="en-US" sz="1400" dirty="0" smtClean="0">
+              <a:rPr lang="en-US" sz="1400" dirty="0">
                 <a:solidFill>
                   <a:schemeClr val="tx1"/>
                 </a:solidFill>
@@ -3637,7 +4170,7 @@
               <a:t> from </a:t>
             </a:r>
             <a:r>
-              <a:rPr lang="en-US" sz="1400" dirty="0" err="1" smtClean="0">
+              <a:rPr lang="en-US" sz="1400" dirty="0" err="1">
                 <a:solidFill>
                   <a:schemeClr val="tx1"/>
                 </a:solidFill>
@@ -3647,7 +4180,7 @@
               <a:t>GeneWays</a:t>
             </a:r>
             <a:r>
-              <a:rPr lang="en-US" sz="1400" dirty="0" smtClean="0">
+              <a:rPr lang="en-US" sz="1400" dirty="0">
                 <a:solidFill>
                   <a:schemeClr val="tx1"/>
                 </a:solidFill>
@@ -3656,13 +4189,6 @@
               </a:rPr>
               <a:t> [53]</a:t>
             </a:r>
-            <a:endParaRPr lang="en-US" sz="1400" dirty="0">
-              <a:solidFill>
-                <a:schemeClr val="tx1"/>
-              </a:solidFill>
-              <a:latin typeface="Helvetica"/>
-              <a:cs typeface="Helvetica"/>
-            </a:endParaRPr>
           </a:p>
         </p:txBody>
       </p:sp>
@@ -3737,14 +4263,14 @@
           <a:lstStyle/>
           <a:p>
             <a:r>
-              <a:rPr lang="en-US" sz="1600" dirty="0" smtClean="0">
+              <a:rPr lang="en-US" sz="1600" dirty="0">
                 <a:latin typeface="Helvetica"/>
                 <a:cs typeface="Helvetica"/>
               </a:rPr>
               <a:t>Data sources for predicted </a:t>
             </a:r>
             <a:r>
-              <a:rPr lang="en-US" sz="1600" dirty="0" err="1" smtClean="0">
+              <a:rPr lang="en-US" sz="1600" dirty="0" err="1">
                 <a:latin typeface="Helvetica"/>
                 <a:cs typeface="Helvetica"/>
               </a:rPr>
@@ -3798,7 +4324,7 @@
           <a:p>
             <a:pPr algn="ctr"/>
             <a:r>
-              <a:rPr lang="en-US" sz="1400" dirty="0" smtClean="0">
+              <a:rPr lang="en-US" sz="1400" dirty="0">
                 <a:solidFill>
                   <a:schemeClr val="tx1"/>
                 </a:solidFill>
@@ -3807,13 +4333,6 @@
               </a:rPr>
               <a:t>Reactome [23]</a:t>
             </a:r>
-            <a:endParaRPr lang="en-US" sz="1400" dirty="0">
-              <a:solidFill>
-                <a:schemeClr val="tx1"/>
-              </a:solidFill>
-              <a:latin typeface="Helvetica"/>
-              <a:cs typeface="Helvetica"/>
-            </a:endParaRPr>
           </a:p>
         </p:txBody>
       </p:sp>
@@ -3858,7 +4377,7 @@
           <a:p>
             <a:pPr algn="ctr"/>
             <a:r>
-              <a:rPr lang="en-US" sz="1400" dirty="0" smtClean="0">
+              <a:rPr lang="en-US" sz="1400" dirty="0">
                 <a:solidFill>
                   <a:schemeClr val="tx1"/>
                 </a:solidFill>
@@ -3867,13 +4386,6 @@
               </a:rPr>
               <a:t>Panther [60]</a:t>
             </a:r>
-            <a:endParaRPr lang="en-US" sz="1400" dirty="0">
-              <a:solidFill>
-                <a:schemeClr val="tx1"/>
-              </a:solidFill>
-              <a:latin typeface="Helvetica"/>
-              <a:cs typeface="Helvetica"/>
-            </a:endParaRPr>
           </a:p>
         </p:txBody>
       </p:sp>
@@ -3918,7 +4430,7 @@
           <a:p>
             <a:pPr algn="ctr"/>
             <a:r>
-              <a:rPr lang="en-US" sz="1400" dirty="0" smtClean="0">
+              <a:rPr lang="en-US" sz="1400" dirty="0">
                 <a:solidFill>
                   <a:schemeClr val="tx1"/>
                 </a:solidFill>
@@ -3927,13 +4439,6 @@
               </a:rPr>
               <a:t>KEGG [63]</a:t>
             </a:r>
-            <a:endParaRPr lang="en-US" sz="1400" dirty="0">
-              <a:solidFill>
-                <a:schemeClr val="tx1"/>
-              </a:solidFill>
-              <a:latin typeface="Helvetica"/>
-              <a:cs typeface="Helvetica"/>
-            </a:endParaRPr>
           </a:p>
         </p:txBody>
       </p:sp>
@@ -3978,7 +4483,7 @@
           <a:p>
             <a:pPr algn="ctr"/>
             <a:r>
-              <a:rPr lang="en-US" sz="1400" dirty="0" smtClean="0">
+              <a:rPr lang="en-US" sz="1400" dirty="0">
                 <a:solidFill>
                   <a:schemeClr val="tx1"/>
                 </a:solidFill>
@@ -3987,13 +4492,6 @@
               </a:rPr>
               <a:t>TRED [64]</a:t>
             </a:r>
-            <a:endParaRPr lang="en-US" sz="1400" dirty="0">
-              <a:solidFill>
-                <a:schemeClr val="tx1"/>
-              </a:solidFill>
-              <a:latin typeface="Helvetica"/>
-              <a:cs typeface="Helvetica"/>
-            </a:endParaRPr>
           </a:p>
         </p:txBody>
       </p:sp>
@@ -4038,7 +4536,7 @@
           <a:p>
             <a:pPr algn="ctr"/>
             <a:r>
-              <a:rPr lang="en-US" sz="1400" dirty="0" smtClean="0">
+              <a:rPr lang="en-US" sz="1400" dirty="0">
                 <a:solidFill>
                   <a:schemeClr val="tx1"/>
                 </a:solidFill>
@@ -4048,7 +4546,7 @@
               <a:t>NCI-</a:t>
             </a:r>
             <a:r>
-              <a:rPr lang="en-US" sz="1400" dirty="0" err="1" smtClean="0">
+              <a:rPr lang="en-US" sz="1400" dirty="0" err="1">
                 <a:solidFill>
                   <a:schemeClr val="tx1"/>
                 </a:solidFill>
@@ -4058,7 +4556,7 @@
               <a:t>BioCarta</a:t>
             </a:r>
             <a:r>
-              <a:rPr lang="en-US" sz="1400" dirty="0" smtClean="0">
+              <a:rPr lang="en-US" sz="1400" dirty="0">
                 <a:solidFill>
                   <a:schemeClr val="tx1"/>
                 </a:solidFill>
@@ -4067,13 +4565,6 @@
               </a:rPr>
               <a:t> [62]</a:t>
             </a:r>
-            <a:endParaRPr lang="en-US" sz="1400" dirty="0">
-              <a:solidFill>
-                <a:schemeClr val="tx1"/>
-              </a:solidFill>
-              <a:latin typeface="Helvetica"/>
-              <a:cs typeface="Helvetica"/>
-            </a:endParaRPr>
           </a:p>
         </p:txBody>
       </p:sp>
@@ -4118,7 +4609,7 @@
           <a:p>
             <a:pPr algn="ctr"/>
             <a:r>
-              <a:rPr lang="en-US" sz="1400" dirty="0" smtClean="0">
+              <a:rPr lang="en-US" sz="1400" dirty="0">
                 <a:solidFill>
                   <a:schemeClr val="tx1"/>
                 </a:solidFill>
@@ -4127,13 +4618,6 @@
               </a:rPr>
               <a:t>NCI-Nature [62]</a:t>
             </a:r>
-            <a:endParaRPr lang="en-US" sz="1400" dirty="0">
-              <a:solidFill>
-                <a:schemeClr val="tx1"/>
-              </a:solidFill>
-              <a:latin typeface="Helvetica"/>
-              <a:cs typeface="Helvetica"/>
-            </a:endParaRPr>
           </a:p>
         </p:txBody>
       </p:sp>
@@ -4178,7 +4662,7 @@
           <a:p>
             <a:pPr algn="ctr"/>
             <a:r>
-              <a:rPr lang="en-US" sz="1400" dirty="0" err="1" smtClean="0">
+              <a:rPr lang="en-US" sz="1400" dirty="0" err="1">
                 <a:solidFill>
                   <a:schemeClr val="tx1"/>
                 </a:solidFill>
@@ -4188,7 +4672,7 @@
               <a:t>CellMap</a:t>
             </a:r>
             <a:r>
-              <a:rPr lang="en-US" sz="1400" dirty="0" smtClean="0">
+              <a:rPr lang="en-US" sz="1400" dirty="0">
                 <a:solidFill>
                   <a:schemeClr val="tx1"/>
                 </a:solidFill>
@@ -4197,13 +4681,6 @@
               </a:rPr>
               <a:t> [61]</a:t>
             </a:r>
-            <a:endParaRPr lang="en-US" sz="1400" dirty="0">
-              <a:solidFill>
-                <a:schemeClr val="tx1"/>
-              </a:solidFill>
-              <a:latin typeface="Helvetica"/>
-              <a:cs typeface="Helvetica"/>
-            </a:endParaRPr>
           </a:p>
         </p:txBody>
       </p:sp>
@@ -4278,7 +4755,7 @@
           <a:p>
             <a:pPr algn="ctr"/>
             <a:r>
-              <a:rPr lang="en-US" sz="1600" dirty="0" smtClean="0">
+              <a:rPr lang="en-US" sz="1600" dirty="0">
                 <a:latin typeface="Helvetica"/>
                 <a:cs typeface="Helvetica"/>
               </a:rPr>
@@ -4288,14 +4765,14 @@
           <a:p>
             <a:pPr algn="ctr"/>
             <a:r>
-              <a:rPr lang="en-US" sz="1600" dirty="0" smtClean="0">
+              <a:rPr lang="en-US" sz="1600" dirty="0">
                 <a:latin typeface="Helvetica"/>
                 <a:cs typeface="Helvetica"/>
               </a:rPr>
               <a:t>annotated </a:t>
             </a:r>
             <a:r>
-              <a:rPr lang="en-US" sz="1600" dirty="0" err="1" smtClean="0">
+              <a:rPr lang="en-US" sz="1600" dirty="0" err="1">
                 <a:latin typeface="Helvetica"/>
                 <a:cs typeface="Helvetica"/>
               </a:rPr>
@@ -4348,7 +4825,7 @@
           <a:p>
             <a:pPr algn="ctr"/>
             <a:r>
-              <a:rPr lang="en-US" dirty="0" smtClean="0">
+              <a:rPr lang="en-US" dirty="0">
                 <a:solidFill>
                   <a:schemeClr val="tx1"/>
                 </a:solidFill>
@@ -4358,7 +4835,7 @@
               <a:t>Naïve </a:t>
             </a:r>
             <a:r>
-              <a:rPr lang="en-US" dirty="0" err="1" smtClean="0">
+              <a:rPr lang="en-US" dirty="0" err="1">
                 <a:solidFill>
                   <a:schemeClr val="tx1"/>
                 </a:solidFill>
@@ -4368,7 +4845,7 @@
               <a:t>Bayes</a:t>
             </a:r>
             <a:r>
-              <a:rPr lang="en-US" dirty="0" smtClean="0">
+              <a:rPr lang="en-US" dirty="0">
                 <a:solidFill>
                   <a:schemeClr val="tx1"/>
                 </a:solidFill>
@@ -4377,13 +4854,6 @@
               </a:rPr>
               <a:t> Classifier</a:t>
             </a:r>
-            <a:endParaRPr lang="en-US" dirty="0">
-              <a:solidFill>
-                <a:schemeClr val="tx1"/>
-              </a:solidFill>
-              <a:latin typeface="Helvetica"/>
-              <a:cs typeface="Helvetica"/>
-            </a:endParaRPr>
           </a:p>
         </p:txBody>
       </p:sp>
@@ -4563,19 +5033,8 @@
                 <a:latin typeface="Helvetica"/>
                 <a:cs typeface="Helvetica"/>
               </a:rPr>
-              <a:t>t</a:t>
-            </a:r>
-            <a:r>
-              <a:rPr lang="en-US" sz="1600" dirty="0" smtClean="0">
-                <a:latin typeface="Helvetica"/>
-                <a:cs typeface="Helvetica"/>
-              </a:rPr>
-              <a:t>rained by</a:t>
-            </a:r>
-            <a:endParaRPr lang="en-US" sz="1600" dirty="0">
-              <a:latin typeface="Helvetica"/>
-              <a:cs typeface="Helvetica"/>
-            </a:endParaRPr>
+              <a:t>trained by</a:t>
+            </a:r>
           </a:p>
         </p:txBody>
       </p:sp>
@@ -4606,19 +5065,8 @@
                 <a:latin typeface="Helvetica"/>
                 <a:cs typeface="Helvetica"/>
               </a:rPr>
-              <a:t>v</a:t>
-            </a:r>
-            <a:r>
-              <a:rPr lang="en-US" sz="1600" dirty="0" smtClean="0">
-                <a:latin typeface="Helvetica"/>
-                <a:cs typeface="Helvetica"/>
-              </a:rPr>
-              <a:t>alidated by</a:t>
-            </a:r>
-            <a:endParaRPr lang="en-US" sz="1600" dirty="0">
-              <a:latin typeface="Helvetica"/>
-              <a:cs typeface="Helvetica"/>
-            </a:endParaRPr>
+              <a:t>validated by</a:t>
+            </a:r>
           </a:p>
         </p:txBody>
       </p:sp>
@@ -4664,7 +5112,7 @@
           <a:p>
             <a:pPr algn="ctr"/>
             <a:r>
-              <a:rPr lang="en-US" dirty="0" smtClean="0">
+              <a:rPr lang="en-US" dirty="0">
                 <a:solidFill>
                   <a:schemeClr val="tx1"/>
                 </a:solidFill>
@@ -4674,7 +5122,7 @@
               <a:t>Predicted </a:t>
             </a:r>
             <a:r>
-              <a:rPr lang="en-US" dirty="0" err="1" smtClean="0">
+              <a:rPr lang="en-US" dirty="0" err="1">
                 <a:solidFill>
                   <a:schemeClr val="tx1"/>
                 </a:solidFill>
@@ -4735,7 +5183,7 @@
           <a:p>
             <a:pPr algn="ctr"/>
             <a:r>
-              <a:rPr lang="en-US" dirty="0" smtClean="0">
+              <a:rPr lang="en-US" dirty="0">
                 <a:solidFill>
                   <a:schemeClr val="tx1"/>
                 </a:solidFill>
@@ -4745,7 +5193,7 @@
               <a:t>Annotated </a:t>
             </a:r>
             <a:r>
-              <a:rPr lang="en-US" dirty="0" err="1" smtClean="0">
+              <a:rPr lang="en-US" dirty="0" err="1">
                 <a:solidFill>
                   <a:schemeClr val="tx1"/>
                 </a:solidFill>
@@ -4909,7 +5357,7 @@
           <a:p>
             <a:pPr algn="ctr"/>
             <a:r>
-              <a:rPr lang="en-US" dirty="0" smtClean="0">
+              <a:rPr lang="en-US" dirty="0">
                 <a:solidFill>
                   <a:schemeClr val="tx1"/>
                 </a:solidFill>
@@ -4918,7 +5366,1857 @@
               </a:rPr>
               <a:t>FI Network</a:t>
             </a:r>
-            <a:endParaRPr lang="en-US" dirty="0">
+          </a:p>
+        </p:txBody>
+      </p:sp>
+      <p:cxnSp>
+        <p:nvCxnSpPr>
+          <p:cNvPr id="56" name="Straight Arrow Connector 55"/>
+          <p:cNvCxnSpPr/>
+          <p:nvPr/>
+        </p:nvCxnSpPr>
+        <p:spPr>
+          <a:xfrm rot="5400000">
+            <a:off x="2722594" y="5634301"/>
+            <a:ext cx="622586" cy="2117"/>
+          </a:xfrm>
+          <a:prstGeom prst="straightConnector1">
+            <a:avLst/>
+          </a:prstGeom>
+          <a:ln>
+            <a:tailEnd type="arrow"/>
+          </a:ln>
+        </p:spPr>
+        <p:style>
+          <a:lnRef idx="2">
+            <a:schemeClr val="accent1"/>
+          </a:lnRef>
+          <a:fillRef idx="0">
+            <a:schemeClr val="accent1"/>
+          </a:fillRef>
+          <a:effectRef idx="1">
+            <a:schemeClr val="accent1"/>
+          </a:effectRef>
+          <a:fontRef idx="minor">
+            <a:schemeClr val="tx1"/>
+          </a:fontRef>
+        </p:style>
+      </p:cxnSp>
+      <p:sp>
+        <p:nvSpPr>
+          <p:cNvPr id="2" name="Rounded Rectangle 1"/>
+          <p:cNvSpPr/>
+          <p:nvPr/>
+        </p:nvSpPr>
+        <p:spPr>
+          <a:xfrm>
+            <a:off x="677335" y="1741633"/>
+            <a:ext cx="2201333" cy="233795"/>
+          </a:xfrm>
+          <a:prstGeom prst="roundRect">
+            <a:avLst/>
+          </a:prstGeom>
+          <a:effectLst/>
+        </p:spPr>
+        <p:style>
+          <a:lnRef idx="1">
+            <a:schemeClr val="accent1"/>
+          </a:lnRef>
+          <a:fillRef idx="3">
+            <a:schemeClr val="accent1"/>
+          </a:fillRef>
+          <a:effectRef idx="2">
+            <a:schemeClr val="accent1"/>
+          </a:effectRef>
+          <a:fontRef idx="minor">
+            <a:schemeClr val="lt1"/>
+          </a:fontRef>
+        </p:style>
+        <p:txBody>
+          <a:bodyPr rtlCol="0" anchor="ctr"/>
+          <a:lstStyle/>
+          <a:p>
+            <a:pPr algn="ctr"/>
+            <a:r>
+              <a:rPr lang="en-US" sz="1200" dirty="0"/>
+              <a:t>Genetic Interaction from RH</a:t>
+            </a:r>
+            <a:r>
+              <a:rPr lang="en-US" sz="1200" baseline="30000" dirty="0"/>
+              <a:t>1</a:t>
+            </a:r>
+          </a:p>
+        </p:txBody>
+      </p:sp>
+      <p:sp>
+        <p:nvSpPr>
+          <p:cNvPr id="15" name="TextBox 14"/>
+          <p:cNvSpPr txBox="1"/>
+          <p:nvPr/>
+        </p:nvSpPr>
+        <p:spPr>
+          <a:xfrm>
+            <a:off x="4262381" y="5976094"/>
+            <a:ext cx="4862540" cy="861774"/>
+          </a:xfrm>
+          <a:prstGeom prst="rect">
+            <a:avLst/>
+          </a:prstGeom>
+        </p:spPr>
+        <p:style>
+          <a:lnRef idx="1">
+            <a:schemeClr val="accent1"/>
+          </a:lnRef>
+          <a:fillRef idx="2">
+            <a:schemeClr val="accent1"/>
+          </a:fillRef>
+          <a:effectRef idx="1">
+            <a:schemeClr val="accent1"/>
+          </a:effectRef>
+          <a:fontRef idx="minor">
+            <a:schemeClr val="dk1"/>
+          </a:fontRef>
+        </p:style>
+        <p:txBody>
+          <a:bodyPr wrap="square" rtlCol="0">
+            <a:spAutoFit/>
+          </a:bodyPr>
+          <a:lstStyle/>
+          <a:p>
+            <a:r>
+              <a:rPr lang="en-US" sz="1000" dirty="0"/>
+              <a:t>1. Lin, A.; Wang, R. T.; </a:t>
+            </a:r>
+            <a:r>
+              <a:rPr lang="en-US" sz="1000" dirty="0" err="1"/>
+              <a:t>Ahn</a:t>
+            </a:r>
+            <a:r>
+              <a:rPr lang="en-US" sz="1000" dirty="0"/>
+              <a:t>, S.; Park, C. C. &amp; Smith, D. J. (2010). </a:t>
+            </a:r>
+            <a:r>
+              <a:rPr lang="en-US" sz="1000" i="1" dirty="0"/>
+              <a:t>Genome Res </a:t>
+            </a:r>
+            <a:r>
+              <a:rPr lang="en-US" sz="1000" b="1" i="1" dirty="0"/>
+              <a:t>20(8), 1122—1132. (Note: This data set is not used)</a:t>
+            </a:r>
+            <a:endParaRPr lang="en-US" sz="1000" dirty="0"/>
+          </a:p>
+          <a:p>
+            <a:r>
+              <a:rPr lang="en-US" sz="1000" dirty="0"/>
+              <a:t>2. Data has not been changed since last build</a:t>
+            </a:r>
+          </a:p>
+          <a:p>
+            <a:r>
+              <a:rPr lang="en-US" sz="1000" dirty="0"/>
+              <a:t>3. These pathways or features will not be included in this build? Need to check how many </a:t>
+            </a:r>
+            <a:r>
+              <a:rPr lang="en-US" sz="1000" dirty="0" err="1"/>
+              <a:t>Fis</a:t>
+            </a:r>
+            <a:r>
+              <a:rPr lang="en-US" sz="1000" dirty="0"/>
+              <a:t> contributed from NCI-</a:t>
+            </a:r>
+            <a:r>
+              <a:rPr lang="en-US" sz="1000" dirty="0" err="1"/>
+              <a:t>BioCarta</a:t>
+            </a:r>
+            <a:r>
+              <a:rPr lang="en-US" sz="1000" dirty="0"/>
+              <a:t>, and </a:t>
+            </a:r>
+            <a:r>
+              <a:rPr lang="en-US" sz="1000" dirty="0" err="1"/>
+              <a:t>CellMap</a:t>
+            </a:r>
+            <a:r>
+              <a:rPr lang="en-US" sz="1000" dirty="0"/>
+              <a:t>.</a:t>
+            </a:r>
+          </a:p>
+        </p:txBody>
+      </p:sp>
+      <p:sp>
+        <p:nvSpPr>
+          <p:cNvPr id="24" name="TextBox 23"/>
+          <p:cNvSpPr txBox="1"/>
+          <p:nvPr/>
+        </p:nvSpPr>
+        <p:spPr>
+          <a:xfrm>
+            <a:off x="8053323" y="3934765"/>
+            <a:ext cx="335857" cy="235962"/>
+          </a:xfrm>
+          <a:prstGeom prst="rect">
+            <a:avLst/>
+          </a:prstGeom>
+          <a:noFill/>
+        </p:spPr>
+        <p:txBody>
+          <a:bodyPr wrap="none" rtlCol="0">
+            <a:spAutoFit/>
+          </a:bodyPr>
+          <a:lstStyle/>
+          <a:p>
+            <a:r>
+              <a:rPr lang="en-US" sz="1400" baseline="30000" dirty="0"/>
+              <a:t>2,3</a:t>
+            </a:r>
+          </a:p>
+        </p:txBody>
+      </p:sp>
+      <p:sp>
+        <p:nvSpPr>
+          <p:cNvPr id="42" name="TextBox 41"/>
+          <p:cNvSpPr txBox="1"/>
+          <p:nvPr/>
+        </p:nvSpPr>
+        <p:spPr>
+          <a:xfrm>
+            <a:off x="3289717" y="1364116"/>
+            <a:ext cx="248786" cy="235962"/>
+          </a:xfrm>
+          <a:prstGeom prst="rect">
+            <a:avLst/>
+          </a:prstGeom>
+          <a:noFill/>
+        </p:spPr>
+        <p:txBody>
+          <a:bodyPr wrap="none" rtlCol="0">
+            <a:spAutoFit/>
+          </a:bodyPr>
+          <a:lstStyle/>
+          <a:p>
+            <a:r>
+              <a:rPr lang="en-US" sz="1400" baseline="30000" dirty="0"/>
+              <a:t>2</a:t>
+            </a:r>
+          </a:p>
+        </p:txBody>
+      </p:sp>
+      <p:sp>
+        <p:nvSpPr>
+          <p:cNvPr id="43" name="TextBox 42"/>
+          <p:cNvSpPr txBox="1"/>
+          <p:nvPr/>
+        </p:nvSpPr>
+        <p:spPr>
+          <a:xfrm>
+            <a:off x="7585811" y="1368993"/>
+            <a:ext cx="248786" cy="235962"/>
+          </a:xfrm>
+          <a:prstGeom prst="rect">
+            <a:avLst/>
+          </a:prstGeom>
+          <a:noFill/>
+        </p:spPr>
+        <p:txBody>
+          <a:bodyPr wrap="none" rtlCol="0">
+            <a:spAutoFit/>
+          </a:bodyPr>
+          <a:lstStyle/>
+          <a:p>
+            <a:r>
+              <a:rPr lang="en-US" sz="1400" baseline="30000" dirty="0"/>
+              <a:t>2</a:t>
+            </a:r>
+          </a:p>
+        </p:txBody>
+      </p:sp>
+      <p:sp>
+        <p:nvSpPr>
+          <p:cNvPr id="44" name="TextBox 43"/>
+          <p:cNvSpPr txBox="1"/>
+          <p:nvPr/>
+        </p:nvSpPr>
+        <p:spPr>
+          <a:xfrm>
+            <a:off x="5637988" y="1731951"/>
+            <a:ext cx="335857" cy="235962"/>
+          </a:xfrm>
+          <a:prstGeom prst="rect">
+            <a:avLst/>
+          </a:prstGeom>
+          <a:noFill/>
+        </p:spPr>
+        <p:txBody>
+          <a:bodyPr wrap="none" rtlCol="0">
+            <a:spAutoFit/>
+          </a:bodyPr>
+          <a:lstStyle/>
+          <a:p>
+            <a:r>
+              <a:rPr lang="en-US" sz="1400" baseline="30000" dirty="0"/>
+              <a:t>2,3</a:t>
+            </a:r>
+          </a:p>
+        </p:txBody>
+      </p:sp>
+      <p:sp>
+        <p:nvSpPr>
+          <p:cNvPr id="45" name="TextBox 44"/>
+          <p:cNvSpPr txBox="1"/>
+          <p:nvPr/>
+        </p:nvSpPr>
+        <p:spPr>
+          <a:xfrm>
+            <a:off x="7834597" y="3270034"/>
+            <a:ext cx="335857" cy="235962"/>
+          </a:xfrm>
+          <a:prstGeom prst="rect">
+            <a:avLst/>
+          </a:prstGeom>
+          <a:noFill/>
+        </p:spPr>
+        <p:txBody>
+          <a:bodyPr wrap="none" rtlCol="0">
+            <a:spAutoFit/>
+          </a:bodyPr>
+          <a:lstStyle/>
+          <a:p>
+            <a:r>
+              <a:rPr lang="en-US" sz="1400" baseline="30000" dirty="0"/>
+              <a:t>2,3</a:t>
+            </a:r>
+          </a:p>
+        </p:txBody>
+      </p:sp>
+      <p:sp>
+        <p:nvSpPr>
+          <p:cNvPr id="46" name="TextBox 45"/>
+          <p:cNvSpPr txBox="1"/>
+          <p:nvPr/>
+        </p:nvSpPr>
+        <p:spPr>
+          <a:xfrm>
+            <a:off x="7758658" y="4570447"/>
+            <a:ext cx="248786" cy="235962"/>
+          </a:xfrm>
+          <a:prstGeom prst="rect">
+            <a:avLst/>
+          </a:prstGeom>
+          <a:noFill/>
+        </p:spPr>
+        <p:txBody>
+          <a:bodyPr wrap="none" rtlCol="0">
+            <a:spAutoFit/>
+          </a:bodyPr>
+          <a:lstStyle/>
+          <a:p>
+            <a:r>
+              <a:rPr lang="en-US" sz="1400" baseline="30000" dirty="0"/>
+              <a:t>2</a:t>
+            </a:r>
+          </a:p>
+        </p:txBody>
+      </p:sp>
+      <p:sp>
+        <p:nvSpPr>
+          <p:cNvPr id="47" name="TextBox 46"/>
+          <p:cNvSpPr txBox="1"/>
+          <p:nvPr/>
+        </p:nvSpPr>
+        <p:spPr>
+          <a:xfrm>
+            <a:off x="7840322" y="2965089"/>
+            <a:ext cx="335857" cy="235962"/>
+          </a:xfrm>
+          <a:prstGeom prst="rect">
+            <a:avLst/>
+          </a:prstGeom>
+          <a:noFill/>
+        </p:spPr>
+        <p:txBody>
+          <a:bodyPr wrap="none" rtlCol="0">
+            <a:spAutoFit/>
+          </a:bodyPr>
+          <a:lstStyle/>
+          <a:p>
+            <a:r>
+              <a:rPr lang="en-US" sz="1400" baseline="30000" dirty="0"/>
+              <a:t>2,3</a:t>
+            </a:r>
+          </a:p>
+        </p:txBody>
+      </p:sp>
+    </p:spTree>
+    <p:extLst>
+      <p:ext uri="{BB962C8B-B14F-4D97-AF65-F5344CB8AC3E}">
+        <p14:creationId xmlns:p14="http://schemas.microsoft.com/office/powerpoint/2010/main" val="3334401698"/>
+      </p:ext>
+    </p:extLst>
+  </p:cSld>
+  <p:clrMapOvr>
+    <a:masterClrMapping/>
+  </p:clrMapOvr>
+</p:sld>
+</file>
+
+<file path=ppt/slides/slide2.xml><?xml version="1.0" encoding="utf-8"?>
+<p:sld xmlns:a="http://schemas.openxmlformats.org/drawingml/2006/main" xmlns:r="http://schemas.openxmlformats.org/officeDocument/2006/relationships" xmlns:p="http://schemas.openxmlformats.org/presentationml/2006/main">
+  <p:cSld>
+    <p:spTree>
+      <p:nvGrpSpPr>
+        <p:cNvPr id="1" name=""/>
+        <p:cNvGrpSpPr/>
+        <p:nvPr/>
+      </p:nvGrpSpPr>
+      <p:grpSpPr>
+        <a:xfrm>
+          <a:off x="0" y="0"/>
+          <a:ext cx="0" cy="0"/>
+          <a:chOff x="0" y="0"/>
+          <a:chExt cx="0" cy="0"/>
+        </a:xfrm>
+      </p:grpSpPr>
+      <p:sp>
+        <p:nvSpPr>
+          <p:cNvPr id="2" name="Title 1">
+            <a:extLst>
+              <a:ext uri="{FF2B5EF4-FFF2-40B4-BE49-F238E27FC236}">
+                <a16:creationId xmlns:a16="http://schemas.microsoft.com/office/drawing/2014/main" id="{96B24667-2FED-5A4A-8C61-F8AFE18AE3A2}"/>
+              </a:ext>
+            </a:extLst>
+          </p:cNvPr>
+          <p:cNvSpPr>
+            <a:spLocks noGrp="1"/>
+          </p:cNvSpPr>
+          <p:nvPr>
+            <p:ph type="title"/>
+          </p:nvPr>
+        </p:nvSpPr>
+        <p:spPr>
+          <a:xfrm>
+            <a:off x="138794" y="0"/>
+            <a:ext cx="8797050" cy="1066800"/>
+          </a:xfrm>
+        </p:spPr>
+        <p:txBody>
+          <a:bodyPr/>
+          <a:lstStyle/>
+          <a:p>
+            <a:r>
+              <a:rPr lang="en-US" sz="2800" dirty="0"/>
+              <a:t>RF-based Pipeline to Construct the FI Network</a:t>
+            </a:r>
+          </a:p>
+        </p:txBody>
+      </p:sp>
+      <p:sp>
+        <p:nvSpPr>
+          <p:cNvPr id="12" name="Rectangle 11">
+            <a:extLst>
+              <a:ext uri="{FF2B5EF4-FFF2-40B4-BE49-F238E27FC236}">
+                <a16:creationId xmlns:a16="http://schemas.microsoft.com/office/drawing/2014/main" id="{DD0F1C35-922A-034A-804E-F3F7B9F7562B}"/>
+              </a:ext>
+            </a:extLst>
+          </p:cNvPr>
+          <p:cNvSpPr/>
+          <p:nvPr/>
+        </p:nvSpPr>
+        <p:spPr bwMode="auto">
+          <a:xfrm>
+            <a:off x="138797" y="1535790"/>
+            <a:ext cx="2339435" cy="691074"/>
+          </a:xfrm>
+          <a:prstGeom prst="rect">
+            <a:avLst/>
+          </a:prstGeom>
+          <a:solidFill>
+            <a:srgbClr val="CFDDC8"/>
+          </a:solidFill>
+          <a:ln w="9525" cap="flat" cmpd="sng" algn="ctr">
+            <a:solidFill>
+              <a:schemeClr val="tx1"/>
+            </a:solidFill>
+            <a:prstDash val="solid"/>
+            <a:round/>
+            <a:headEnd type="none" w="med" len="med"/>
+            <a:tailEnd type="none" w="med" len="med"/>
+          </a:ln>
+          <a:effectLst/>
+        </p:spPr>
+        <p:txBody>
+          <a:bodyPr vert="horz" wrap="square" lIns="91440" tIns="45720" rIns="91440" bIns="45720" numCol="1" rtlCol="0" anchor="ctr" anchorCtr="0" compatLnSpc="1">
+            <a:prstTxWarp prst="textNoShape">
+              <a:avLst/>
+            </a:prstTxWarp>
+          </a:bodyPr>
+          <a:lstStyle/>
+          <a:p>
+            <a:pPr marL="0" marR="0" indent="0" algn="ctr" defTabSz="1981200" rtl="0" eaLnBrk="0" fontAlgn="base" latinLnBrk="0" hangingPunct="0">
+              <a:lnSpc>
+                <a:spcPct val="100000"/>
+              </a:lnSpc>
+              <a:spcBef>
+                <a:spcPct val="0"/>
+              </a:spcBef>
+              <a:spcAft>
+                <a:spcPct val="0"/>
+              </a:spcAft>
+              <a:buClrTx/>
+              <a:buSzTx/>
+              <a:buFontTx/>
+              <a:buNone/>
+              <a:tabLst/>
+            </a:pPr>
+            <a:r>
+              <a:rPr kumimoji="0" lang="en-US" sz="1200" b="0" i="0" u="none" strike="noStrike" cap="none" normalizeH="0" baseline="0" dirty="0" err="1">
+                <a:ln>
+                  <a:noFill/>
+                </a:ln>
+                <a:solidFill>
+                  <a:schemeClr val="tx1"/>
+                </a:solidFill>
+                <a:effectLst/>
+                <a:latin typeface="Arial" charset="0"/>
+              </a:rPr>
+              <a:t>GTEx</a:t>
+            </a:r>
+            <a:r>
+              <a:rPr kumimoji="0" lang="en-US" sz="1200" b="0" i="0" u="none" strike="noStrike" cap="none" normalizeH="0" baseline="0" dirty="0">
+                <a:ln>
+                  <a:noFill/>
+                </a:ln>
+                <a:solidFill>
+                  <a:schemeClr val="tx1"/>
+                </a:solidFill>
+                <a:effectLst/>
+                <a:latin typeface="Arial" charset="0"/>
+              </a:rPr>
+              <a:t> tissue </a:t>
+            </a:r>
+            <a:r>
+              <a:rPr lang="en-US" sz="1200" dirty="0"/>
+              <a:t>s</a:t>
+            </a:r>
+            <a:r>
+              <a:rPr kumimoji="0" lang="en-US" sz="1200" b="0" i="0" u="none" strike="noStrike" cap="none" normalizeH="0" baseline="0" dirty="0">
+                <a:ln>
+                  <a:noFill/>
+                </a:ln>
+                <a:solidFill>
+                  <a:schemeClr val="tx1"/>
+                </a:solidFill>
+                <a:effectLst/>
+                <a:latin typeface="Arial" charset="0"/>
+              </a:rPr>
+              <a:t>pecific </a:t>
+            </a:r>
+            <a:r>
+              <a:rPr kumimoji="0" lang="en-US" sz="1200" b="0" i="0" u="none" strike="noStrike" cap="none" normalizeH="0" baseline="0" dirty="0" err="1">
+                <a:ln>
+                  <a:noFill/>
+                </a:ln>
+                <a:solidFill>
+                  <a:schemeClr val="tx1"/>
+                </a:solidFill>
+                <a:effectLst/>
+                <a:latin typeface="Arial" charset="0"/>
+              </a:rPr>
+              <a:t>CoExpression</a:t>
+            </a:r>
+            <a:r>
+              <a:rPr kumimoji="0" lang="en-US" sz="1200" b="0" i="0" u="none" strike="noStrike" cap="none" normalizeH="0" baseline="0" dirty="0">
+                <a:ln>
+                  <a:noFill/>
+                </a:ln>
+                <a:solidFill>
+                  <a:schemeClr val="tx1"/>
+                </a:solidFill>
+                <a:effectLst/>
+                <a:latin typeface="Arial" charset="0"/>
+              </a:rPr>
+              <a:t> (48 tissues, ~200K pairs each)</a:t>
+            </a:r>
+          </a:p>
+        </p:txBody>
+      </p:sp>
+      <p:sp>
+        <p:nvSpPr>
+          <p:cNvPr id="13" name="Rectangle 12">
+            <a:extLst>
+              <a:ext uri="{FF2B5EF4-FFF2-40B4-BE49-F238E27FC236}">
+                <a16:creationId xmlns:a16="http://schemas.microsoft.com/office/drawing/2014/main" id="{A9371354-8044-FC4A-9C49-E5D8EB5AFF88}"/>
+              </a:ext>
+            </a:extLst>
+          </p:cNvPr>
+          <p:cNvSpPr/>
+          <p:nvPr/>
+        </p:nvSpPr>
+        <p:spPr bwMode="auto">
+          <a:xfrm>
+            <a:off x="138794" y="2331509"/>
+            <a:ext cx="2339436" cy="691073"/>
+          </a:xfrm>
+          <a:prstGeom prst="rect">
+            <a:avLst/>
+          </a:prstGeom>
+          <a:solidFill>
+            <a:srgbClr val="CFDDC8"/>
+          </a:solidFill>
+          <a:ln w="9525" cap="flat" cmpd="sng" algn="ctr">
+            <a:solidFill>
+              <a:schemeClr val="tx1"/>
+            </a:solidFill>
+            <a:prstDash val="solid"/>
+            <a:round/>
+            <a:headEnd type="none" w="med" len="med"/>
+            <a:tailEnd type="none" w="med" len="med"/>
+          </a:ln>
+          <a:effectLst/>
+        </p:spPr>
+        <p:txBody>
+          <a:bodyPr vert="horz" wrap="square" lIns="91440" tIns="45720" rIns="91440" bIns="45720" numCol="1" rtlCol="0" anchor="ctr" anchorCtr="0" compatLnSpc="1">
+            <a:prstTxWarp prst="textNoShape">
+              <a:avLst/>
+            </a:prstTxWarp>
+          </a:bodyPr>
+          <a:lstStyle/>
+          <a:p>
+            <a:pPr marL="0" marR="0" indent="0" algn="ctr" defTabSz="1981200" rtl="0" eaLnBrk="0" fontAlgn="base" latinLnBrk="0" hangingPunct="0">
+              <a:lnSpc>
+                <a:spcPct val="100000"/>
+              </a:lnSpc>
+              <a:spcBef>
+                <a:spcPct val="0"/>
+              </a:spcBef>
+              <a:spcAft>
+                <a:spcPct val="0"/>
+              </a:spcAft>
+              <a:buClrTx/>
+              <a:buSzTx/>
+              <a:buFontTx/>
+              <a:buNone/>
+              <a:tabLst/>
+            </a:pPr>
+            <a:r>
+              <a:rPr lang="en-US" sz="1200" dirty="0"/>
+              <a:t>TCGA cancer specific </a:t>
+            </a:r>
+            <a:r>
+              <a:rPr lang="en-US" sz="1200" dirty="0" err="1"/>
+              <a:t>Coexpression</a:t>
+            </a:r>
+            <a:r>
+              <a:rPr lang="en-US" sz="1200" dirty="0"/>
+              <a:t> (31 cancers, ~200K </a:t>
+            </a:r>
+            <a:r>
+              <a:rPr lang="en-US" sz="1200" dirty="0" err="1"/>
+              <a:t>paris</a:t>
+            </a:r>
+            <a:r>
+              <a:rPr lang="en-US" sz="1200" dirty="0"/>
+              <a:t> each)</a:t>
+            </a:r>
+            <a:endParaRPr kumimoji="0" lang="en-US" sz="1200" b="0" i="0" u="none" strike="noStrike" cap="none" normalizeH="0" baseline="0" dirty="0">
+              <a:ln>
+                <a:noFill/>
+              </a:ln>
+              <a:solidFill>
+                <a:schemeClr val="tx1"/>
+              </a:solidFill>
+              <a:effectLst/>
+              <a:latin typeface="Arial" charset="0"/>
+            </a:endParaRPr>
+          </a:p>
+        </p:txBody>
+      </p:sp>
+      <p:sp>
+        <p:nvSpPr>
+          <p:cNvPr id="14" name="Rectangle 13">
+            <a:extLst>
+              <a:ext uri="{FF2B5EF4-FFF2-40B4-BE49-F238E27FC236}">
+                <a16:creationId xmlns:a16="http://schemas.microsoft.com/office/drawing/2014/main" id="{3A588A5D-A0B3-8448-8E76-04330CA1DB61}"/>
+              </a:ext>
+            </a:extLst>
+          </p:cNvPr>
+          <p:cNvSpPr/>
+          <p:nvPr/>
+        </p:nvSpPr>
+        <p:spPr bwMode="auto">
+          <a:xfrm>
+            <a:off x="138794" y="3127227"/>
+            <a:ext cx="2339436" cy="579715"/>
+          </a:xfrm>
+          <a:prstGeom prst="rect">
+            <a:avLst/>
+          </a:prstGeom>
+          <a:solidFill>
+            <a:srgbClr val="CFDDC8"/>
+          </a:solidFill>
+          <a:ln w="9525" cap="flat" cmpd="sng" algn="ctr">
+            <a:solidFill>
+              <a:schemeClr val="tx1"/>
+            </a:solidFill>
+            <a:prstDash val="solid"/>
+            <a:round/>
+            <a:headEnd type="none" w="med" len="med"/>
+            <a:tailEnd type="none" w="med" len="med"/>
+          </a:ln>
+          <a:effectLst/>
+        </p:spPr>
+        <p:txBody>
+          <a:bodyPr vert="horz" wrap="square" lIns="91440" tIns="45720" rIns="91440" bIns="45720" numCol="1" rtlCol="0" anchor="ctr" anchorCtr="0" compatLnSpc="1">
+            <a:prstTxWarp prst="textNoShape">
+              <a:avLst/>
+            </a:prstTxWarp>
+          </a:bodyPr>
+          <a:lstStyle/>
+          <a:p>
+            <a:pPr marL="0" marR="0" indent="0" algn="ctr" defTabSz="1981200" rtl="0" eaLnBrk="0" fontAlgn="base" latinLnBrk="0" hangingPunct="0">
+              <a:lnSpc>
+                <a:spcPct val="100000"/>
+              </a:lnSpc>
+              <a:spcBef>
+                <a:spcPct val="0"/>
+              </a:spcBef>
+              <a:spcAft>
+                <a:spcPct val="0"/>
+              </a:spcAft>
+              <a:buClrTx/>
+              <a:buSzTx/>
+              <a:buFontTx/>
+              <a:buNone/>
+              <a:tabLst/>
+            </a:pPr>
+            <a:r>
+              <a:rPr kumimoji="0" lang="en-US" sz="1200" b="0" i="0" u="none" strike="noStrike" cap="none" normalizeH="0" baseline="0" dirty="0" err="1">
+                <a:ln>
+                  <a:noFill/>
+                </a:ln>
+                <a:solidFill>
+                  <a:schemeClr val="tx1"/>
+                </a:solidFill>
+                <a:effectLst/>
+                <a:latin typeface="Arial" charset="0"/>
+              </a:rPr>
+              <a:t>Harmonizome</a:t>
+            </a:r>
+            <a:r>
+              <a:rPr kumimoji="0" lang="en-US" sz="1200" b="0" i="0" u="none" strike="noStrike" cap="none" normalizeH="0" baseline="0" dirty="0">
+                <a:ln>
+                  <a:noFill/>
+                </a:ln>
+                <a:solidFill>
+                  <a:schemeClr val="tx1"/>
+                </a:solidFill>
+                <a:effectLst/>
+                <a:latin typeface="Arial" charset="0"/>
+              </a:rPr>
+              <a:t> gene </a:t>
+            </a:r>
+            <a:r>
+              <a:rPr lang="en-US" sz="1200" dirty="0"/>
+              <a:t>s</a:t>
+            </a:r>
+            <a:r>
+              <a:rPr kumimoji="0" lang="en-US" sz="1200" b="0" i="0" u="none" strike="noStrike" cap="none" normalizeH="0" baseline="0" dirty="0">
+                <a:ln>
+                  <a:noFill/>
+                </a:ln>
+                <a:solidFill>
+                  <a:schemeClr val="tx1"/>
+                </a:solidFill>
+                <a:effectLst/>
+                <a:latin typeface="Arial" charset="0"/>
+              </a:rPr>
+              <a:t>imilarity (20 data </a:t>
+            </a:r>
+            <a:r>
+              <a:rPr kumimoji="0" lang="en-US" sz="1200" b="0" i="0" u="none" strike="noStrike" cap="none" normalizeH="0" baseline="0" dirty="0" err="1">
+                <a:ln>
+                  <a:noFill/>
+                </a:ln>
+                <a:solidFill>
+                  <a:schemeClr val="tx1"/>
+                </a:solidFill>
+                <a:effectLst/>
+                <a:latin typeface="Arial" charset="0"/>
+              </a:rPr>
+              <a:t>soruces</a:t>
+            </a:r>
+            <a:r>
+              <a:rPr kumimoji="0" lang="en-US" sz="1200" b="0" i="0" u="none" strike="noStrike" cap="none" normalizeH="0" baseline="0" dirty="0">
+                <a:ln>
+                  <a:noFill/>
+                </a:ln>
+                <a:solidFill>
+                  <a:schemeClr val="tx1"/>
+                </a:solidFill>
+                <a:effectLst/>
+                <a:latin typeface="Arial" charset="0"/>
+              </a:rPr>
+              <a:t>)</a:t>
+            </a:r>
+          </a:p>
+        </p:txBody>
+      </p:sp>
+      <p:sp>
+        <p:nvSpPr>
+          <p:cNvPr id="15" name="Rectangle 14">
+            <a:extLst>
+              <a:ext uri="{FF2B5EF4-FFF2-40B4-BE49-F238E27FC236}">
+                <a16:creationId xmlns:a16="http://schemas.microsoft.com/office/drawing/2014/main" id="{4F446891-67FB-CB41-8FA0-2617692D3508}"/>
+              </a:ext>
+            </a:extLst>
+          </p:cNvPr>
+          <p:cNvSpPr/>
+          <p:nvPr/>
+        </p:nvSpPr>
+        <p:spPr bwMode="auto">
+          <a:xfrm>
+            <a:off x="138794" y="3872868"/>
+            <a:ext cx="2339437" cy="993569"/>
+          </a:xfrm>
+          <a:prstGeom prst="rect">
+            <a:avLst/>
+          </a:prstGeom>
+          <a:solidFill>
+            <a:srgbClr val="CFDDC8"/>
+          </a:solidFill>
+          <a:ln w="9525" cap="flat" cmpd="sng" algn="ctr">
+            <a:solidFill>
+              <a:schemeClr val="tx1"/>
+            </a:solidFill>
+            <a:prstDash val="solid"/>
+            <a:round/>
+            <a:headEnd type="none" w="med" len="med"/>
+            <a:tailEnd type="none" w="med" len="med"/>
+          </a:ln>
+          <a:effectLst/>
+        </p:spPr>
+        <p:txBody>
+          <a:bodyPr vert="horz" wrap="square" lIns="91440" tIns="45720" rIns="91440" bIns="45720" numCol="1" rtlCol="0" anchor="ctr" anchorCtr="0" compatLnSpc="1">
+            <a:prstTxWarp prst="textNoShape">
+              <a:avLst/>
+            </a:prstTxWarp>
+          </a:bodyPr>
+          <a:lstStyle/>
+          <a:p>
+            <a:pPr marL="0" marR="0" indent="0" algn="ctr" defTabSz="1981200" rtl="0" eaLnBrk="0" fontAlgn="base" latinLnBrk="0" hangingPunct="0">
+              <a:lnSpc>
+                <a:spcPct val="100000"/>
+              </a:lnSpc>
+              <a:spcBef>
+                <a:spcPct val="0"/>
+              </a:spcBef>
+              <a:spcAft>
+                <a:spcPct val="0"/>
+              </a:spcAft>
+              <a:buClrTx/>
+              <a:buSzTx/>
+              <a:buFontTx/>
+              <a:buNone/>
+              <a:tabLst/>
+            </a:pPr>
+            <a:r>
+              <a:rPr lang="en-US" sz="1200" dirty="0"/>
+              <a:t>Human protein-protein interactions  (5 datasets for human PPIs, mapped human PPIs from mouse, fly, worm and yeast)</a:t>
+            </a:r>
+            <a:endParaRPr kumimoji="0" lang="en-US" sz="1200" b="0" i="0" u="none" strike="noStrike" cap="none" normalizeH="0" baseline="0" dirty="0">
+              <a:ln>
+                <a:noFill/>
+              </a:ln>
+              <a:solidFill>
+                <a:schemeClr val="tx1"/>
+              </a:solidFill>
+              <a:effectLst/>
+              <a:latin typeface="Arial" charset="0"/>
+            </a:endParaRPr>
+          </a:p>
+        </p:txBody>
+      </p:sp>
+      <p:sp>
+        <p:nvSpPr>
+          <p:cNvPr id="42" name="Rectangle 41">
+            <a:extLst>
+              <a:ext uri="{FF2B5EF4-FFF2-40B4-BE49-F238E27FC236}">
+                <a16:creationId xmlns:a16="http://schemas.microsoft.com/office/drawing/2014/main" id="{59E23D4F-098A-3F43-967F-40B9B5BF5D80}"/>
+              </a:ext>
+            </a:extLst>
+          </p:cNvPr>
+          <p:cNvSpPr/>
+          <p:nvPr/>
+        </p:nvSpPr>
+        <p:spPr bwMode="auto">
+          <a:xfrm>
+            <a:off x="138794" y="4987503"/>
+            <a:ext cx="2339436" cy="579715"/>
+          </a:xfrm>
+          <a:prstGeom prst="rect">
+            <a:avLst/>
+          </a:prstGeom>
+          <a:solidFill>
+            <a:srgbClr val="CFDDC8"/>
+          </a:solidFill>
+          <a:ln w="9525" cap="flat" cmpd="sng" algn="ctr">
+            <a:solidFill>
+              <a:schemeClr val="tx1"/>
+            </a:solidFill>
+            <a:prstDash val="solid"/>
+            <a:round/>
+            <a:headEnd type="none" w="med" len="med"/>
+            <a:tailEnd type="none" w="med" len="med"/>
+          </a:ln>
+          <a:effectLst/>
+        </p:spPr>
+        <p:txBody>
+          <a:bodyPr vert="horz" wrap="square" lIns="91440" tIns="45720" rIns="91440" bIns="45720" numCol="1" rtlCol="0" anchor="ctr" anchorCtr="0" compatLnSpc="1">
+            <a:prstTxWarp prst="textNoShape">
+              <a:avLst/>
+            </a:prstTxWarp>
+          </a:bodyPr>
+          <a:lstStyle/>
+          <a:p>
+            <a:pPr marL="0" marR="0" indent="0" algn="ctr" defTabSz="1981200" rtl="0" eaLnBrk="0" fontAlgn="base" latinLnBrk="0" hangingPunct="0">
+              <a:lnSpc>
+                <a:spcPct val="100000"/>
+              </a:lnSpc>
+              <a:spcBef>
+                <a:spcPct val="0"/>
+              </a:spcBef>
+              <a:spcAft>
+                <a:spcPct val="0"/>
+              </a:spcAft>
+              <a:buClrTx/>
+              <a:buSzTx/>
+              <a:buFontTx/>
+              <a:buNone/>
+              <a:tabLst/>
+            </a:pPr>
+            <a:r>
+              <a:rPr kumimoji="0" lang="en-US" sz="1200" b="0" i="0" u="none" strike="noStrike" cap="none" normalizeH="0" baseline="0" dirty="0">
+                <a:ln>
+                  <a:noFill/>
+                </a:ln>
+                <a:solidFill>
+                  <a:schemeClr val="tx1"/>
+                </a:solidFill>
+                <a:effectLst/>
+                <a:latin typeface="Arial" charset="0"/>
+              </a:rPr>
+              <a:t>Protein domain-domain interaction</a:t>
+            </a:r>
+          </a:p>
+        </p:txBody>
+      </p:sp>
+      <p:sp>
+        <p:nvSpPr>
+          <p:cNvPr id="43" name="Rectangle 42">
+            <a:extLst>
+              <a:ext uri="{FF2B5EF4-FFF2-40B4-BE49-F238E27FC236}">
+                <a16:creationId xmlns:a16="http://schemas.microsoft.com/office/drawing/2014/main" id="{7C055948-1DCC-F649-9CF7-CB86A889D71D}"/>
+              </a:ext>
+            </a:extLst>
+          </p:cNvPr>
+          <p:cNvSpPr/>
+          <p:nvPr/>
+        </p:nvSpPr>
+        <p:spPr bwMode="auto">
+          <a:xfrm>
+            <a:off x="138794" y="5657426"/>
+            <a:ext cx="2339436" cy="579715"/>
+          </a:xfrm>
+          <a:prstGeom prst="rect">
+            <a:avLst/>
+          </a:prstGeom>
+          <a:solidFill>
+            <a:srgbClr val="CFDDC8"/>
+          </a:solidFill>
+          <a:ln w="9525" cap="flat" cmpd="sng" algn="ctr">
+            <a:solidFill>
+              <a:schemeClr val="tx1"/>
+            </a:solidFill>
+            <a:prstDash val="solid"/>
+            <a:round/>
+            <a:headEnd type="none" w="med" len="med"/>
+            <a:tailEnd type="none" w="med" len="med"/>
+          </a:ln>
+          <a:effectLst/>
+        </p:spPr>
+        <p:txBody>
+          <a:bodyPr vert="horz" wrap="square" lIns="91440" tIns="45720" rIns="91440" bIns="45720" numCol="1" rtlCol="0" anchor="ctr" anchorCtr="0" compatLnSpc="1">
+            <a:prstTxWarp prst="textNoShape">
+              <a:avLst/>
+            </a:prstTxWarp>
+          </a:bodyPr>
+          <a:lstStyle/>
+          <a:p>
+            <a:pPr marL="0" marR="0" indent="0" algn="ctr" defTabSz="1981200" rtl="0" eaLnBrk="0" fontAlgn="base" latinLnBrk="0" hangingPunct="0">
+              <a:lnSpc>
+                <a:spcPct val="100000"/>
+              </a:lnSpc>
+              <a:spcBef>
+                <a:spcPct val="0"/>
+              </a:spcBef>
+              <a:spcAft>
+                <a:spcPct val="0"/>
+              </a:spcAft>
+              <a:buClrTx/>
+              <a:buSzTx/>
+              <a:buFontTx/>
+              <a:buNone/>
+              <a:tabLst/>
+            </a:pPr>
+            <a:r>
+              <a:rPr kumimoji="0" lang="en-US" sz="1200" b="0" i="0" u="none" strike="noStrike" cap="none" normalizeH="0" baseline="0" dirty="0">
+                <a:ln>
+                  <a:noFill/>
+                </a:ln>
+                <a:solidFill>
+                  <a:schemeClr val="tx1"/>
+                </a:solidFill>
+                <a:effectLst/>
+                <a:latin typeface="Arial" charset="0"/>
+              </a:rPr>
+              <a:t>Gene GO biological </a:t>
+            </a:r>
+            <a:r>
+              <a:rPr lang="en-US" sz="1200" dirty="0"/>
+              <a:t>p</a:t>
+            </a:r>
+            <a:r>
+              <a:rPr kumimoji="0" lang="en-US" sz="1200" b="0" i="0" u="none" strike="noStrike" cap="none" normalizeH="0" baseline="0" dirty="0">
+                <a:ln>
+                  <a:noFill/>
+                </a:ln>
+                <a:solidFill>
+                  <a:schemeClr val="tx1"/>
+                </a:solidFill>
+                <a:effectLst/>
+                <a:latin typeface="Arial" charset="0"/>
+              </a:rPr>
+              <a:t>rocess </a:t>
+            </a:r>
+            <a:r>
+              <a:rPr lang="en-US" sz="1200" dirty="0"/>
+              <a:t>a</a:t>
+            </a:r>
+            <a:r>
+              <a:rPr kumimoji="0" lang="en-US" sz="1200" b="0" i="0" u="none" strike="noStrike" cap="none" normalizeH="0" baseline="0" dirty="0">
+                <a:ln>
+                  <a:noFill/>
+                </a:ln>
+                <a:solidFill>
+                  <a:schemeClr val="tx1"/>
+                </a:solidFill>
+                <a:effectLst/>
+                <a:latin typeface="Arial" charset="0"/>
+              </a:rPr>
+              <a:t>nnotation</a:t>
+            </a:r>
+          </a:p>
+        </p:txBody>
+      </p:sp>
+      <p:sp>
+        <p:nvSpPr>
+          <p:cNvPr id="44" name="Right Brace 43">
+            <a:extLst>
+              <a:ext uri="{FF2B5EF4-FFF2-40B4-BE49-F238E27FC236}">
+                <a16:creationId xmlns:a16="http://schemas.microsoft.com/office/drawing/2014/main" id="{9E6E0BEB-37AB-C64B-95F0-0110E61D7354}"/>
+              </a:ext>
+            </a:extLst>
+          </p:cNvPr>
+          <p:cNvSpPr/>
+          <p:nvPr/>
+        </p:nvSpPr>
+        <p:spPr bwMode="auto">
+          <a:xfrm>
+            <a:off x="2479054" y="1535790"/>
+            <a:ext cx="800100" cy="4701351"/>
+          </a:xfrm>
+          <a:prstGeom prst="rightBrace">
+            <a:avLst>
+              <a:gd name="adj1" fmla="val 8333"/>
+              <a:gd name="adj2" fmla="val 49714"/>
+            </a:avLst>
+          </a:prstGeom>
+          <a:noFill/>
+          <a:ln w="12700" cap="flat" cmpd="sng" algn="ctr">
+            <a:solidFill>
+              <a:schemeClr val="tx1"/>
+            </a:solidFill>
+            <a:prstDash val="solid"/>
+            <a:round/>
+            <a:headEnd type="none" w="med" len="med"/>
+            <a:tailEnd type="none" w="med" len="med"/>
+          </a:ln>
+          <a:effectLst/>
+        </p:spPr>
+        <p:txBody>
+          <a:bodyPr vert="horz" wrap="square" lIns="91440" tIns="45720" rIns="91440" bIns="45720" numCol="1" rtlCol="0" anchor="t" anchorCtr="0" compatLnSpc="1">
+            <a:prstTxWarp prst="textNoShape">
+              <a:avLst/>
+            </a:prstTxWarp>
+          </a:bodyPr>
+          <a:lstStyle/>
+          <a:p>
+            <a:pPr marL="0" marR="0" indent="0" algn="l" defTabSz="1981200" rtl="0" eaLnBrk="0" fontAlgn="base" latinLnBrk="0" hangingPunct="0">
+              <a:lnSpc>
+                <a:spcPct val="100000"/>
+              </a:lnSpc>
+              <a:spcBef>
+                <a:spcPct val="0"/>
+              </a:spcBef>
+              <a:spcAft>
+                <a:spcPct val="0"/>
+              </a:spcAft>
+              <a:buClrTx/>
+              <a:buSzTx/>
+              <a:buFontTx/>
+              <a:buNone/>
+              <a:tabLst/>
+            </a:pPr>
+            <a:endParaRPr kumimoji="0" lang="en-US" sz="5200" b="0" i="0" u="none" strike="noStrike" cap="none" normalizeH="0" baseline="0">
+              <a:ln>
+                <a:noFill/>
+              </a:ln>
+              <a:solidFill>
+                <a:schemeClr val="tx1"/>
+              </a:solidFill>
+              <a:effectLst/>
+              <a:latin typeface="Arial" charset="0"/>
+            </a:endParaRPr>
+          </a:p>
+        </p:txBody>
+      </p:sp>
+      <p:sp>
+        <p:nvSpPr>
+          <p:cNvPr id="47" name="TextBox 46">
+            <a:extLst>
+              <a:ext uri="{FF2B5EF4-FFF2-40B4-BE49-F238E27FC236}">
+                <a16:creationId xmlns:a16="http://schemas.microsoft.com/office/drawing/2014/main" id="{B401394A-EB5B-3B4B-9F8E-6AFC2F965831}"/>
+              </a:ext>
+            </a:extLst>
+          </p:cNvPr>
+          <p:cNvSpPr txBox="1"/>
+          <p:nvPr/>
+        </p:nvSpPr>
+        <p:spPr>
+          <a:xfrm>
+            <a:off x="2737306" y="2926990"/>
+            <a:ext cx="940459" cy="523220"/>
+          </a:xfrm>
+          <a:prstGeom prst="rect">
+            <a:avLst/>
+          </a:prstGeom>
+          <a:noFill/>
+        </p:spPr>
+        <p:txBody>
+          <a:bodyPr wrap="square" rtlCol="0">
+            <a:spAutoFit/>
+          </a:bodyPr>
+          <a:lstStyle/>
+          <a:p>
+            <a:pPr algn="ctr"/>
+            <a:r>
+              <a:rPr lang="en-US" sz="1400" dirty="0"/>
+              <a:t>106 features</a:t>
+            </a:r>
+          </a:p>
+        </p:txBody>
+      </p:sp>
+      <p:sp>
+        <p:nvSpPr>
+          <p:cNvPr id="48" name="Rounded Rectangle 47">
+            <a:extLst>
+              <a:ext uri="{FF2B5EF4-FFF2-40B4-BE49-F238E27FC236}">
+                <a16:creationId xmlns:a16="http://schemas.microsoft.com/office/drawing/2014/main" id="{9C5955CF-44B7-CB44-8AA1-3D2CA68F3FD0}"/>
+              </a:ext>
+            </a:extLst>
+          </p:cNvPr>
+          <p:cNvSpPr/>
+          <p:nvPr/>
+        </p:nvSpPr>
+        <p:spPr bwMode="auto">
+          <a:xfrm>
+            <a:off x="3230644" y="3636661"/>
+            <a:ext cx="1959430" cy="462362"/>
+          </a:xfrm>
+          <a:prstGeom prst="roundRect">
+            <a:avLst/>
+          </a:prstGeom>
+          <a:solidFill>
+            <a:schemeClr val="accent6">
+              <a:lumMod val="40000"/>
+              <a:lumOff val="60000"/>
+            </a:schemeClr>
+          </a:solidFill>
+          <a:ln w="9525" cap="flat" cmpd="sng" algn="ctr">
+            <a:solidFill>
+              <a:schemeClr val="tx1"/>
+            </a:solidFill>
+            <a:prstDash val="solid"/>
+            <a:round/>
+            <a:headEnd type="none" w="med" len="med"/>
+            <a:tailEnd type="none" w="med" len="med"/>
+          </a:ln>
+          <a:effectLst/>
+        </p:spPr>
+        <p:txBody>
+          <a:bodyPr vert="horz" wrap="square" lIns="91440" tIns="45720" rIns="91440" bIns="45720" numCol="1" rtlCol="0" anchor="ctr" anchorCtr="0" compatLnSpc="1">
+            <a:prstTxWarp prst="textNoShape">
+              <a:avLst/>
+            </a:prstTxWarp>
+          </a:bodyPr>
+          <a:lstStyle/>
+          <a:p>
+            <a:pPr marL="0" marR="0" indent="0" algn="ctr" defTabSz="1981200" rtl="0" eaLnBrk="0" fontAlgn="base" latinLnBrk="0" hangingPunct="0">
+              <a:lnSpc>
+                <a:spcPct val="100000"/>
+              </a:lnSpc>
+              <a:spcBef>
+                <a:spcPct val="0"/>
+              </a:spcBef>
+              <a:spcAft>
+                <a:spcPct val="0"/>
+              </a:spcAft>
+              <a:buClrTx/>
+              <a:buSzTx/>
+              <a:buFontTx/>
+              <a:buNone/>
+              <a:tabLst/>
+            </a:pPr>
+            <a:r>
+              <a:rPr kumimoji="0" lang="en-US" sz="1800" b="0" i="0" u="none" strike="noStrike" cap="none" normalizeH="0" baseline="0" dirty="0">
+                <a:ln>
+                  <a:noFill/>
+                </a:ln>
+                <a:solidFill>
+                  <a:schemeClr val="tx1"/>
+                </a:solidFill>
+                <a:effectLst/>
+                <a:latin typeface="Arial" charset="0"/>
+              </a:rPr>
+              <a:t>Random Forest</a:t>
+            </a:r>
+          </a:p>
+        </p:txBody>
+      </p:sp>
+      <p:sp>
+        <p:nvSpPr>
+          <p:cNvPr id="49" name="Rectangle 48">
+            <a:extLst>
+              <a:ext uri="{FF2B5EF4-FFF2-40B4-BE49-F238E27FC236}">
+                <a16:creationId xmlns:a16="http://schemas.microsoft.com/office/drawing/2014/main" id="{06824AD3-36E2-4B49-8422-FB195174676F}"/>
+              </a:ext>
+            </a:extLst>
+          </p:cNvPr>
+          <p:cNvSpPr/>
+          <p:nvPr/>
+        </p:nvSpPr>
+        <p:spPr bwMode="auto">
+          <a:xfrm>
+            <a:off x="3230644" y="1922530"/>
+            <a:ext cx="1959430" cy="867030"/>
+          </a:xfrm>
+          <a:prstGeom prst="rect">
+            <a:avLst/>
+          </a:prstGeom>
+          <a:solidFill>
+            <a:srgbClr val="CFDDC8"/>
+          </a:solidFill>
+          <a:ln w="9525" cap="flat" cmpd="sng" algn="ctr">
+            <a:solidFill>
+              <a:schemeClr val="tx1"/>
+            </a:solidFill>
+            <a:prstDash val="solid"/>
+            <a:round/>
+            <a:headEnd type="none" w="med" len="med"/>
+            <a:tailEnd type="none" w="med" len="med"/>
+          </a:ln>
+          <a:effectLst/>
+        </p:spPr>
+        <p:txBody>
+          <a:bodyPr vert="horz" wrap="square" lIns="91440" tIns="45720" rIns="91440" bIns="45720" numCol="1" rtlCol="0" anchor="ctr" anchorCtr="0" compatLnSpc="1">
+            <a:prstTxWarp prst="textNoShape">
+              <a:avLst/>
+            </a:prstTxWarp>
+          </a:bodyPr>
+          <a:lstStyle/>
+          <a:p>
+            <a:pPr marL="0" marR="0" indent="0" algn="ctr" defTabSz="1981200" rtl="0" eaLnBrk="0" fontAlgn="base" latinLnBrk="0" hangingPunct="0">
+              <a:lnSpc>
+                <a:spcPct val="100000"/>
+              </a:lnSpc>
+              <a:spcBef>
+                <a:spcPct val="0"/>
+              </a:spcBef>
+              <a:spcAft>
+                <a:spcPct val="0"/>
+              </a:spcAft>
+              <a:buClrTx/>
+              <a:buSzTx/>
+              <a:buFontTx/>
+              <a:buNone/>
+              <a:tabLst/>
+            </a:pPr>
+            <a:r>
+              <a:rPr lang="en-US" sz="1200" dirty="0"/>
+              <a:t>Functional interactions extracted from Reactome (positive) + random pairs (negative)</a:t>
+            </a:r>
+            <a:endParaRPr kumimoji="0" lang="en-US" sz="1200" b="0" i="0" u="none" strike="noStrike" cap="none" normalizeH="0" baseline="0" dirty="0">
+              <a:ln>
+                <a:noFill/>
+              </a:ln>
+              <a:solidFill>
+                <a:schemeClr val="tx1"/>
+              </a:solidFill>
+              <a:effectLst/>
+              <a:latin typeface="Arial" charset="0"/>
+            </a:endParaRPr>
+          </a:p>
+        </p:txBody>
+      </p:sp>
+      <p:cxnSp>
+        <p:nvCxnSpPr>
+          <p:cNvPr id="51" name="Straight Arrow Connector 50">
+            <a:extLst>
+              <a:ext uri="{FF2B5EF4-FFF2-40B4-BE49-F238E27FC236}">
+                <a16:creationId xmlns:a16="http://schemas.microsoft.com/office/drawing/2014/main" id="{027BD639-4256-3B41-9819-0DF3D6D644CE}"/>
+              </a:ext>
+            </a:extLst>
+          </p:cNvPr>
+          <p:cNvCxnSpPr>
+            <a:cxnSpLocks/>
+            <a:stCxn id="49" idx="2"/>
+            <a:endCxn id="48" idx="0"/>
+          </p:cNvCxnSpPr>
+          <p:nvPr/>
+        </p:nvCxnSpPr>
+        <p:spPr bwMode="auto">
+          <a:xfrm>
+            <a:off x="4210359" y="2789560"/>
+            <a:ext cx="0" cy="847101"/>
+          </a:xfrm>
+          <a:prstGeom prst="straightConnector1">
+            <a:avLst/>
+          </a:prstGeom>
+          <a:solidFill>
+            <a:schemeClr val="accent1"/>
+          </a:solidFill>
+          <a:ln w="12700" cap="flat" cmpd="sng" algn="ctr">
+            <a:solidFill>
+              <a:schemeClr val="tx1"/>
+            </a:solidFill>
+            <a:prstDash val="solid"/>
+            <a:round/>
+            <a:headEnd type="none" w="med" len="med"/>
+            <a:tailEnd type="triangle"/>
+          </a:ln>
+          <a:effectLst/>
+        </p:spPr>
+      </p:cxnSp>
+      <p:sp>
+        <p:nvSpPr>
+          <p:cNvPr id="52" name="TextBox 51">
+            <a:extLst>
+              <a:ext uri="{FF2B5EF4-FFF2-40B4-BE49-F238E27FC236}">
+                <a16:creationId xmlns:a16="http://schemas.microsoft.com/office/drawing/2014/main" id="{F7F962E1-52BB-1140-A8A5-C5A5FFB35BCD}"/>
+              </a:ext>
+            </a:extLst>
+          </p:cNvPr>
+          <p:cNvSpPr txBox="1"/>
+          <p:nvPr/>
+        </p:nvSpPr>
+        <p:spPr>
+          <a:xfrm>
+            <a:off x="4171588" y="3117767"/>
+            <a:ext cx="1313180" cy="338554"/>
+          </a:xfrm>
+          <a:prstGeom prst="rect">
+            <a:avLst/>
+          </a:prstGeom>
+          <a:noFill/>
+        </p:spPr>
+        <p:txBody>
+          <a:bodyPr wrap="none" rtlCol="0">
+            <a:spAutoFit/>
+          </a:bodyPr>
+          <a:lstStyle/>
+          <a:p>
+            <a:r>
+              <a:rPr lang="en-US" sz="1600" dirty="0"/>
+              <a:t>training data</a:t>
+            </a:r>
+          </a:p>
+        </p:txBody>
+      </p:sp>
+      <p:sp>
+        <p:nvSpPr>
+          <p:cNvPr id="53" name="Rectangle 52">
+            <a:extLst>
+              <a:ext uri="{FF2B5EF4-FFF2-40B4-BE49-F238E27FC236}">
+                <a16:creationId xmlns:a16="http://schemas.microsoft.com/office/drawing/2014/main" id="{0CAF2B94-58EF-A544-8783-F842A35E9E01}"/>
+              </a:ext>
+            </a:extLst>
+          </p:cNvPr>
+          <p:cNvSpPr/>
+          <p:nvPr/>
+        </p:nvSpPr>
+        <p:spPr bwMode="auto">
+          <a:xfrm>
+            <a:off x="3189823" y="4865440"/>
+            <a:ext cx="2041071" cy="974434"/>
+          </a:xfrm>
+          <a:prstGeom prst="rect">
+            <a:avLst/>
+          </a:prstGeom>
+          <a:solidFill>
+            <a:srgbClr val="CFDDC8"/>
+          </a:solidFill>
+          <a:ln w="9525" cap="flat" cmpd="sng" algn="ctr">
+            <a:solidFill>
+              <a:schemeClr val="tx1"/>
+            </a:solidFill>
+            <a:prstDash val="solid"/>
+            <a:round/>
+            <a:headEnd type="none" w="med" len="med"/>
+            <a:tailEnd type="none" w="med" len="med"/>
+          </a:ln>
+          <a:effectLst/>
+        </p:spPr>
+        <p:txBody>
+          <a:bodyPr vert="horz" wrap="square" lIns="91440" tIns="45720" rIns="91440" bIns="45720" numCol="1" rtlCol="0" anchor="ctr" anchorCtr="0" compatLnSpc="1">
+            <a:prstTxWarp prst="textNoShape">
+              <a:avLst/>
+            </a:prstTxWarp>
+          </a:bodyPr>
+          <a:lstStyle/>
+          <a:p>
+            <a:pPr marL="0" marR="0" indent="0" algn="ctr" defTabSz="1981200" rtl="0" eaLnBrk="0" fontAlgn="base" latinLnBrk="0" hangingPunct="0">
+              <a:lnSpc>
+                <a:spcPct val="100000"/>
+              </a:lnSpc>
+              <a:spcBef>
+                <a:spcPct val="0"/>
+              </a:spcBef>
+              <a:spcAft>
+                <a:spcPct val="0"/>
+              </a:spcAft>
+              <a:buClrTx/>
+              <a:buSzTx/>
+              <a:buFontTx/>
+              <a:buNone/>
+              <a:tabLst/>
+            </a:pPr>
+            <a:r>
+              <a:rPr lang="en-US" sz="1200" dirty="0"/>
+              <a:t>Functional interactions extracted from non-Reactome pathways (positive) + random pairs (negative)</a:t>
+            </a:r>
+            <a:endParaRPr kumimoji="0" lang="en-US" sz="1200" b="0" i="0" u="none" strike="noStrike" cap="none" normalizeH="0" baseline="0" dirty="0">
+              <a:ln>
+                <a:noFill/>
+              </a:ln>
+              <a:solidFill>
+                <a:schemeClr val="tx1"/>
+              </a:solidFill>
+              <a:effectLst/>
+              <a:latin typeface="Arial" charset="0"/>
+            </a:endParaRPr>
+          </a:p>
+        </p:txBody>
+      </p:sp>
+      <p:cxnSp>
+        <p:nvCxnSpPr>
+          <p:cNvPr id="58" name="Straight Arrow Connector 57">
+            <a:extLst>
+              <a:ext uri="{FF2B5EF4-FFF2-40B4-BE49-F238E27FC236}">
+                <a16:creationId xmlns:a16="http://schemas.microsoft.com/office/drawing/2014/main" id="{1FC96282-BF37-3040-83E2-AB26373E22F2}"/>
+              </a:ext>
+            </a:extLst>
+          </p:cNvPr>
+          <p:cNvCxnSpPr>
+            <a:stCxn id="53" idx="0"/>
+            <a:endCxn id="48" idx="2"/>
+          </p:cNvCxnSpPr>
+          <p:nvPr/>
+        </p:nvCxnSpPr>
+        <p:spPr bwMode="auto">
+          <a:xfrm flipV="1">
+            <a:off x="4210359" y="4099023"/>
+            <a:ext cx="0" cy="766417"/>
+          </a:xfrm>
+          <a:prstGeom prst="straightConnector1">
+            <a:avLst/>
+          </a:prstGeom>
+          <a:solidFill>
+            <a:schemeClr val="accent1"/>
+          </a:solidFill>
+          <a:ln w="12700" cap="flat" cmpd="sng" algn="ctr">
+            <a:solidFill>
+              <a:schemeClr val="tx1"/>
+            </a:solidFill>
+            <a:prstDash val="solid"/>
+            <a:round/>
+            <a:headEnd type="none" w="med" len="med"/>
+            <a:tailEnd type="triangle"/>
+          </a:ln>
+          <a:effectLst/>
+        </p:spPr>
+      </p:cxnSp>
+      <p:sp>
+        <p:nvSpPr>
+          <p:cNvPr id="59" name="TextBox 58">
+            <a:extLst>
+              <a:ext uri="{FF2B5EF4-FFF2-40B4-BE49-F238E27FC236}">
+                <a16:creationId xmlns:a16="http://schemas.microsoft.com/office/drawing/2014/main" id="{71845FF3-E810-BB41-BB66-8A267946CD99}"/>
+              </a:ext>
+            </a:extLst>
+          </p:cNvPr>
+          <p:cNvSpPr txBox="1"/>
+          <p:nvPr/>
+        </p:nvSpPr>
+        <p:spPr>
+          <a:xfrm>
+            <a:off x="4171588" y="4268002"/>
+            <a:ext cx="973343" cy="338554"/>
+          </a:xfrm>
+          <a:prstGeom prst="rect">
+            <a:avLst/>
+          </a:prstGeom>
+          <a:noFill/>
+        </p:spPr>
+        <p:txBody>
+          <a:bodyPr wrap="none" rtlCol="0">
+            <a:spAutoFit/>
+          </a:bodyPr>
+          <a:lstStyle/>
+          <a:p>
+            <a:r>
+              <a:rPr lang="en-US" sz="1600" dirty="0"/>
+              <a:t>test data</a:t>
+            </a:r>
+          </a:p>
+        </p:txBody>
+      </p:sp>
+      <p:cxnSp>
+        <p:nvCxnSpPr>
+          <p:cNvPr id="61" name="Straight Arrow Connector 60">
+            <a:extLst>
+              <a:ext uri="{FF2B5EF4-FFF2-40B4-BE49-F238E27FC236}">
+                <a16:creationId xmlns:a16="http://schemas.microsoft.com/office/drawing/2014/main" id="{BB51A15D-906D-8444-92BD-E3247EFB5894}"/>
+              </a:ext>
+            </a:extLst>
+          </p:cNvPr>
+          <p:cNvCxnSpPr>
+            <a:cxnSpLocks/>
+            <a:stCxn id="48" idx="3"/>
+            <a:endCxn id="34" idx="0"/>
+          </p:cNvCxnSpPr>
+          <p:nvPr/>
+        </p:nvCxnSpPr>
+        <p:spPr bwMode="auto">
+          <a:xfrm>
+            <a:off x="5190074" y="3867842"/>
+            <a:ext cx="1279909" cy="292331"/>
+          </a:xfrm>
+          <a:prstGeom prst="bentConnector2">
+            <a:avLst/>
+          </a:prstGeom>
+          <a:solidFill>
+            <a:schemeClr val="accent1"/>
+          </a:solidFill>
+          <a:ln w="12700" cap="flat" cmpd="sng" algn="ctr">
+            <a:solidFill>
+              <a:schemeClr val="tx1"/>
+            </a:solidFill>
+            <a:prstDash val="solid"/>
+            <a:round/>
+            <a:headEnd type="none" w="med" len="med"/>
+            <a:tailEnd type="triangle"/>
+          </a:ln>
+          <a:effectLst/>
+        </p:spPr>
+      </p:cxnSp>
+      <p:sp>
+        <p:nvSpPr>
+          <p:cNvPr id="62" name="TextBox 61">
+            <a:extLst>
+              <a:ext uri="{FF2B5EF4-FFF2-40B4-BE49-F238E27FC236}">
+                <a16:creationId xmlns:a16="http://schemas.microsoft.com/office/drawing/2014/main" id="{46115AE6-AD3D-4145-8FE8-3F7F85B0F73E}"/>
+              </a:ext>
+            </a:extLst>
+          </p:cNvPr>
+          <p:cNvSpPr txBox="1"/>
+          <p:nvPr/>
+        </p:nvSpPr>
+        <p:spPr>
+          <a:xfrm>
+            <a:off x="5478586" y="3566329"/>
+            <a:ext cx="800219" cy="338554"/>
+          </a:xfrm>
+          <a:prstGeom prst="rect">
+            <a:avLst/>
+          </a:prstGeom>
+          <a:noFill/>
+        </p:spPr>
+        <p:txBody>
+          <a:bodyPr wrap="none" rtlCol="0">
+            <a:spAutoFit/>
+          </a:bodyPr>
+          <a:lstStyle/>
+          <a:p>
+            <a:r>
+              <a:rPr lang="en-US" sz="1600" dirty="0"/>
+              <a:t>predict</a:t>
+            </a:r>
+          </a:p>
+        </p:txBody>
+      </p:sp>
+      <p:sp>
+        <p:nvSpPr>
+          <p:cNvPr id="24" name="Rounded Rectangle 23">
+            <a:extLst>
+              <a:ext uri="{FF2B5EF4-FFF2-40B4-BE49-F238E27FC236}">
+                <a16:creationId xmlns:a16="http://schemas.microsoft.com/office/drawing/2014/main" id="{4B0FEDA8-5B55-0161-4526-973F18FC06AF}"/>
+              </a:ext>
+            </a:extLst>
+          </p:cNvPr>
+          <p:cNvSpPr/>
+          <p:nvPr/>
+        </p:nvSpPr>
+        <p:spPr>
+          <a:xfrm>
+            <a:off x="7340399" y="1718822"/>
+            <a:ext cx="1455841" cy="249011"/>
+          </a:xfrm>
+          <a:prstGeom prst="roundRect">
+            <a:avLst/>
+          </a:prstGeom>
+          <a:solidFill>
+            <a:schemeClr val="accent3">
+              <a:lumMod val="20000"/>
+              <a:lumOff val="80000"/>
+            </a:schemeClr>
+          </a:solidFill>
+        </p:spPr>
+        <p:style>
+          <a:lnRef idx="1">
+            <a:schemeClr val="accent1"/>
+          </a:lnRef>
+          <a:fillRef idx="3">
+            <a:schemeClr val="accent1"/>
+          </a:fillRef>
+          <a:effectRef idx="2">
+            <a:schemeClr val="accent1"/>
+          </a:effectRef>
+          <a:fontRef idx="minor">
+            <a:schemeClr val="lt1"/>
+          </a:fontRef>
+        </p:style>
+        <p:txBody>
+          <a:bodyPr rtlCol="0" anchor="ctr"/>
+          <a:lstStyle/>
+          <a:p>
+            <a:pPr algn="ctr"/>
+            <a:r>
+              <a:rPr lang="en-US" sz="1200" dirty="0">
+                <a:solidFill>
+                  <a:schemeClr val="tx1"/>
+                </a:solidFill>
+                <a:latin typeface="Helvetica"/>
+                <a:cs typeface="Helvetica"/>
+              </a:rPr>
+              <a:t>Reactome</a:t>
+            </a:r>
+          </a:p>
+        </p:txBody>
+      </p:sp>
+      <p:sp>
+        <p:nvSpPr>
+          <p:cNvPr id="25" name="Rounded Rectangle 24">
+            <a:extLst>
+              <a:ext uri="{FF2B5EF4-FFF2-40B4-BE49-F238E27FC236}">
+                <a16:creationId xmlns:a16="http://schemas.microsoft.com/office/drawing/2014/main" id="{A33BFC0D-6CE3-8719-96D1-9B66E8517D3A}"/>
+              </a:ext>
+            </a:extLst>
+          </p:cNvPr>
+          <p:cNvSpPr/>
+          <p:nvPr/>
+        </p:nvSpPr>
+        <p:spPr>
+          <a:xfrm>
+            <a:off x="7340399" y="2047332"/>
+            <a:ext cx="1455841" cy="249011"/>
+          </a:xfrm>
+          <a:prstGeom prst="roundRect">
+            <a:avLst/>
+          </a:prstGeom>
+          <a:solidFill>
+            <a:schemeClr val="accent3">
+              <a:lumMod val="20000"/>
+              <a:lumOff val="80000"/>
+            </a:schemeClr>
+          </a:solidFill>
+        </p:spPr>
+        <p:style>
+          <a:lnRef idx="1">
+            <a:schemeClr val="accent1"/>
+          </a:lnRef>
+          <a:fillRef idx="3">
+            <a:schemeClr val="accent1"/>
+          </a:fillRef>
+          <a:effectRef idx="2">
+            <a:schemeClr val="accent1"/>
+          </a:effectRef>
+          <a:fontRef idx="minor">
+            <a:schemeClr val="lt1"/>
+          </a:fontRef>
+        </p:style>
+        <p:txBody>
+          <a:bodyPr rtlCol="0" anchor="ctr"/>
+          <a:lstStyle/>
+          <a:p>
+            <a:pPr algn="ctr"/>
+            <a:r>
+              <a:rPr lang="en-US" sz="1200" dirty="0">
+                <a:solidFill>
+                  <a:schemeClr val="tx1"/>
+                </a:solidFill>
+                <a:latin typeface="Helvetica"/>
+                <a:cs typeface="Helvetica"/>
+              </a:rPr>
+              <a:t>Panther</a:t>
+            </a:r>
+          </a:p>
+        </p:txBody>
+      </p:sp>
+      <p:sp>
+        <p:nvSpPr>
+          <p:cNvPr id="27" name="Rounded Rectangle 26">
+            <a:extLst>
+              <a:ext uri="{FF2B5EF4-FFF2-40B4-BE49-F238E27FC236}">
+                <a16:creationId xmlns:a16="http://schemas.microsoft.com/office/drawing/2014/main" id="{0F41FEE3-4416-52E8-3BBD-EC5A05C85132}"/>
+              </a:ext>
+            </a:extLst>
+          </p:cNvPr>
+          <p:cNvSpPr/>
+          <p:nvPr/>
+        </p:nvSpPr>
+        <p:spPr>
+          <a:xfrm>
+            <a:off x="7340399" y="3032860"/>
+            <a:ext cx="1455841" cy="249011"/>
+          </a:xfrm>
+          <a:prstGeom prst="roundRect">
+            <a:avLst/>
+          </a:prstGeom>
+          <a:solidFill>
+            <a:schemeClr val="accent3">
+              <a:lumMod val="20000"/>
+              <a:lumOff val="80000"/>
+            </a:schemeClr>
+          </a:solidFill>
+        </p:spPr>
+        <p:style>
+          <a:lnRef idx="1">
+            <a:schemeClr val="accent1"/>
+          </a:lnRef>
+          <a:fillRef idx="3">
+            <a:schemeClr val="accent1"/>
+          </a:fillRef>
+          <a:effectRef idx="2">
+            <a:schemeClr val="accent1"/>
+          </a:effectRef>
+          <a:fontRef idx="minor">
+            <a:schemeClr val="lt1"/>
+          </a:fontRef>
+        </p:style>
+        <p:txBody>
+          <a:bodyPr rtlCol="0" anchor="ctr"/>
+          <a:lstStyle/>
+          <a:p>
+            <a:pPr algn="ctr"/>
+            <a:r>
+              <a:rPr lang="en-US" sz="1200" dirty="0">
+                <a:solidFill>
+                  <a:schemeClr val="tx1"/>
+                </a:solidFill>
+                <a:latin typeface="Helvetica"/>
+                <a:cs typeface="Helvetica"/>
+              </a:rPr>
+              <a:t>TRED</a:t>
+            </a:r>
+          </a:p>
+        </p:txBody>
+      </p:sp>
+      <p:sp>
+        <p:nvSpPr>
+          <p:cNvPr id="28" name="Rounded Rectangle 27">
+            <a:extLst>
+              <a:ext uri="{FF2B5EF4-FFF2-40B4-BE49-F238E27FC236}">
+                <a16:creationId xmlns:a16="http://schemas.microsoft.com/office/drawing/2014/main" id="{26EE91DB-55C6-156E-6204-FA557D8E2A7A}"/>
+              </a:ext>
+            </a:extLst>
+          </p:cNvPr>
+          <p:cNvSpPr/>
+          <p:nvPr/>
+        </p:nvSpPr>
+        <p:spPr>
+          <a:xfrm>
+            <a:off x="7340399" y="2704352"/>
+            <a:ext cx="1455841" cy="249011"/>
+          </a:xfrm>
+          <a:prstGeom prst="roundRect">
+            <a:avLst/>
+          </a:prstGeom>
+          <a:solidFill>
+            <a:schemeClr val="accent3">
+              <a:lumMod val="20000"/>
+              <a:lumOff val="80000"/>
+            </a:schemeClr>
+          </a:solidFill>
+        </p:spPr>
+        <p:style>
+          <a:lnRef idx="1">
+            <a:schemeClr val="accent1"/>
+          </a:lnRef>
+          <a:fillRef idx="3">
+            <a:schemeClr val="accent1"/>
+          </a:fillRef>
+          <a:effectRef idx="2">
+            <a:schemeClr val="accent1"/>
+          </a:effectRef>
+          <a:fontRef idx="minor">
+            <a:schemeClr val="lt1"/>
+          </a:fontRef>
+        </p:style>
+        <p:txBody>
+          <a:bodyPr rtlCol="0" anchor="ctr"/>
+          <a:lstStyle/>
+          <a:p>
+            <a:pPr algn="ctr"/>
+            <a:r>
+              <a:rPr lang="en-US" sz="1200" dirty="0">
+                <a:solidFill>
+                  <a:schemeClr val="tx1"/>
+                </a:solidFill>
+                <a:latin typeface="Helvetica"/>
+                <a:cs typeface="Helvetica"/>
+              </a:rPr>
+              <a:t>NCI-</a:t>
+            </a:r>
+            <a:r>
+              <a:rPr lang="en-US" sz="1200" dirty="0" err="1">
+                <a:solidFill>
+                  <a:schemeClr val="tx1"/>
+                </a:solidFill>
+                <a:latin typeface="Helvetica"/>
+                <a:cs typeface="Helvetica"/>
+              </a:rPr>
+              <a:t>BioCarta</a:t>
+            </a:r>
+            <a:endParaRPr lang="en-US" sz="1200" dirty="0">
               <a:solidFill>
                 <a:schemeClr val="tx1"/>
               </a:solidFill>
@@ -4928,54 +7226,32 @@
           </a:p>
         </p:txBody>
       </p:sp>
-      <p:cxnSp>
-        <p:nvCxnSpPr>
-          <p:cNvPr id="56" name="Straight Arrow Connector 55"/>
-          <p:cNvCxnSpPr/>
-          <p:nvPr/>
-        </p:nvCxnSpPr>
-        <p:spPr>
-          <a:xfrm rot="5400000">
-            <a:off x="2722594" y="5634301"/>
-            <a:ext cx="622586" cy="2117"/>
-          </a:xfrm>
-          <a:prstGeom prst="straightConnector1">
-            <a:avLst/>
-          </a:prstGeom>
-          <a:ln>
-            <a:tailEnd type="arrow"/>
-          </a:ln>
-        </p:spPr>
-        <p:style>
-          <a:lnRef idx="2">
-            <a:schemeClr val="accent1"/>
-          </a:lnRef>
-          <a:fillRef idx="0">
-            <a:schemeClr val="accent1"/>
-          </a:fillRef>
-          <a:effectRef idx="1">
-            <a:schemeClr val="accent1"/>
-          </a:effectRef>
-          <a:fontRef idx="minor">
-            <a:schemeClr val="tx1"/>
-          </a:fontRef>
-        </p:style>
-      </p:cxnSp>
-      <p:sp>
-        <p:nvSpPr>
-          <p:cNvPr id="2" name="Rounded Rectangle 1"/>
+      <p:sp>
+        <p:nvSpPr>
+          <p:cNvPr id="29" name="Rounded Rectangle 28">
+            <a:extLst>
+              <a:ext uri="{FF2B5EF4-FFF2-40B4-BE49-F238E27FC236}">
+                <a16:creationId xmlns:a16="http://schemas.microsoft.com/office/drawing/2014/main" id="{9D108C5C-CF63-16F8-E41E-880B174029F9}"/>
+              </a:ext>
+            </a:extLst>
+          </p:cNvPr>
           <p:cNvSpPr/>
           <p:nvPr/>
         </p:nvSpPr>
         <p:spPr>
           <a:xfrm>
-            <a:off x="677335" y="1741633"/>
-            <a:ext cx="2201333" cy="233795"/>
+            <a:off x="7340399" y="2375842"/>
+            <a:ext cx="1455841" cy="249011"/>
           </a:xfrm>
           <a:prstGeom prst="roundRect">
             <a:avLst/>
           </a:prstGeom>
-          <a:effectLst/>
+          <a:solidFill>
+            <a:schemeClr val="accent3">
+              <a:lumMod val="20000"/>
+              <a:lumOff val="80000"/>
+            </a:schemeClr>
+          </a:solidFill>
         </p:spPr>
         <p:style>
           <a:lnRef idx="1">
@@ -4997,126 +7273,402 @@
           <a:p>
             <a:pPr algn="ctr"/>
             <a:r>
-              <a:rPr lang="en-US" sz="1200" dirty="0" smtClean="0"/>
-              <a:t>Genetic Interaction from RH</a:t>
-            </a:r>
-            <a:r>
-              <a:rPr lang="en-US" sz="1200" baseline="30000" dirty="0" smtClean="0"/>
-              <a:t>1</a:t>
-            </a:r>
-            <a:endParaRPr lang="en-US" sz="1200" baseline="30000" dirty="0"/>
-          </a:p>
-        </p:txBody>
-      </p:sp>
-      <p:sp>
-        <p:nvSpPr>
-          <p:cNvPr id="15" name="TextBox 14"/>
+              <a:rPr lang="en-US" sz="1200" dirty="0">
+                <a:solidFill>
+                  <a:schemeClr val="tx1"/>
+                </a:solidFill>
+                <a:latin typeface="Helvetica"/>
+                <a:cs typeface="Helvetica"/>
+              </a:rPr>
+              <a:t>NCI-Nature</a:t>
+            </a:r>
+          </a:p>
+        </p:txBody>
+      </p:sp>
+      <p:sp>
+        <p:nvSpPr>
+          <p:cNvPr id="31" name="Rectangle 30">
+            <a:extLst>
+              <a:ext uri="{FF2B5EF4-FFF2-40B4-BE49-F238E27FC236}">
+                <a16:creationId xmlns:a16="http://schemas.microsoft.com/office/drawing/2014/main" id="{1BCB4D6B-51EE-AC2A-6E19-A69FAED3E52F}"/>
+              </a:ext>
+            </a:extLst>
+          </p:cNvPr>
+          <p:cNvSpPr/>
+          <p:nvPr/>
+        </p:nvSpPr>
+        <p:spPr>
+          <a:xfrm>
+            <a:off x="7255140" y="1629145"/>
+            <a:ext cx="1649267" cy="1732967"/>
+          </a:xfrm>
+          <a:prstGeom prst="rect">
+            <a:avLst/>
+          </a:prstGeom>
+          <a:solidFill>
+            <a:schemeClr val="accent6">
+              <a:lumMod val="20000"/>
+              <a:lumOff val="80000"/>
+              <a:alpha val="10000"/>
+            </a:schemeClr>
+          </a:solidFill>
+        </p:spPr>
+        <p:style>
+          <a:lnRef idx="1">
+            <a:schemeClr val="accent1"/>
+          </a:lnRef>
+          <a:fillRef idx="3">
+            <a:schemeClr val="accent1"/>
+          </a:fillRef>
+          <a:effectRef idx="2">
+            <a:schemeClr val="accent1"/>
+          </a:effectRef>
+          <a:fontRef idx="minor">
+            <a:schemeClr val="lt1"/>
+          </a:fontRef>
+        </p:style>
+        <p:txBody>
+          <a:bodyPr rtlCol="0" anchor="ctr"/>
+          <a:lstStyle/>
+          <a:p>
+            <a:pPr algn="ctr"/>
+            <a:endParaRPr lang="en-US" sz="1200" dirty="0">
+              <a:latin typeface="Helvetica"/>
+              <a:cs typeface="Helvetica"/>
+            </a:endParaRPr>
+          </a:p>
+        </p:txBody>
+      </p:sp>
+      <p:sp>
+        <p:nvSpPr>
+          <p:cNvPr id="32" name="Rectangle 31">
+            <a:extLst>
+              <a:ext uri="{FF2B5EF4-FFF2-40B4-BE49-F238E27FC236}">
+                <a16:creationId xmlns:a16="http://schemas.microsoft.com/office/drawing/2014/main" id="{C1C25139-1747-2356-2B38-14A706A04355}"/>
+              </a:ext>
+            </a:extLst>
+          </p:cNvPr>
+          <p:cNvSpPr/>
+          <p:nvPr/>
+        </p:nvSpPr>
+        <p:spPr>
+          <a:xfrm>
+            <a:off x="5698197" y="2145009"/>
+            <a:ext cx="1649267" cy="461665"/>
+          </a:xfrm>
+          <a:prstGeom prst="rect">
+            <a:avLst/>
+          </a:prstGeom>
+        </p:spPr>
+        <p:txBody>
+          <a:bodyPr wrap="square">
+            <a:spAutoFit/>
+          </a:bodyPr>
+          <a:lstStyle/>
+          <a:p>
+            <a:pPr algn="ctr"/>
+            <a:r>
+              <a:rPr lang="en-US" sz="1200" dirty="0">
+                <a:latin typeface="Helvetica"/>
+                <a:cs typeface="Helvetica"/>
+              </a:rPr>
+              <a:t>Data sources for </a:t>
+            </a:r>
+          </a:p>
+          <a:p>
+            <a:pPr algn="ctr"/>
+            <a:r>
+              <a:rPr lang="en-US" sz="1200" dirty="0">
+                <a:latin typeface="Helvetica"/>
+                <a:cs typeface="Helvetica"/>
+              </a:rPr>
+              <a:t>annotated </a:t>
+            </a:r>
+            <a:r>
+              <a:rPr lang="en-US" sz="1200" dirty="0" err="1">
+                <a:latin typeface="Helvetica"/>
+                <a:cs typeface="Helvetica"/>
+              </a:rPr>
+              <a:t>FIs</a:t>
+            </a:r>
+            <a:endParaRPr lang="en-US" sz="1200" dirty="0">
+              <a:latin typeface="Helvetica"/>
+              <a:cs typeface="Helvetica"/>
+            </a:endParaRPr>
+          </a:p>
+        </p:txBody>
+      </p:sp>
+      <p:sp>
+        <p:nvSpPr>
+          <p:cNvPr id="34" name="Rounded Rectangle 33">
+            <a:extLst>
+              <a:ext uri="{FF2B5EF4-FFF2-40B4-BE49-F238E27FC236}">
+                <a16:creationId xmlns:a16="http://schemas.microsoft.com/office/drawing/2014/main" id="{C3074363-846E-16EE-297F-277B0B8F3356}"/>
+              </a:ext>
+            </a:extLst>
+          </p:cNvPr>
+          <p:cNvSpPr/>
+          <p:nvPr/>
+        </p:nvSpPr>
+        <p:spPr>
+          <a:xfrm>
+            <a:off x="5698197" y="4160173"/>
+            <a:ext cx="1543572" cy="343387"/>
+          </a:xfrm>
+          <a:prstGeom prst="roundRect">
+            <a:avLst/>
+          </a:prstGeom>
+          <a:solidFill>
+            <a:schemeClr val="accent6">
+              <a:lumMod val="20000"/>
+              <a:lumOff val="80000"/>
+              <a:alpha val="15000"/>
+            </a:schemeClr>
+          </a:solidFill>
+        </p:spPr>
+        <p:style>
+          <a:lnRef idx="1">
+            <a:schemeClr val="accent1"/>
+          </a:lnRef>
+          <a:fillRef idx="3">
+            <a:schemeClr val="accent1"/>
+          </a:fillRef>
+          <a:effectRef idx="2">
+            <a:schemeClr val="accent1"/>
+          </a:effectRef>
+          <a:fontRef idx="minor">
+            <a:schemeClr val="lt1"/>
+          </a:fontRef>
+        </p:style>
+        <p:txBody>
+          <a:bodyPr rtlCol="0" anchor="ctr"/>
+          <a:lstStyle/>
+          <a:p>
+            <a:pPr algn="ctr"/>
+            <a:r>
+              <a:rPr lang="en-US" sz="1600" dirty="0">
+                <a:solidFill>
+                  <a:schemeClr val="tx1"/>
+                </a:solidFill>
+                <a:latin typeface="Helvetica"/>
+                <a:cs typeface="Helvetica"/>
+              </a:rPr>
+              <a:t>Predicted </a:t>
+            </a:r>
+            <a:r>
+              <a:rPr lang="en-US" sz="1600" dirty="0" err="1">
+                <a:solidFill>
+                  <a:schemeClr val="tx1"/>
+                </a:solidFill>
+                <a:latin typeface="Helvetica"/>
+                <a:cs typeface="Helvetica"/>
+              </a:rPr>
+              <a:t>FIs</a:t>
+            </a:r>
+            <a:endParaRPr lang="en-US" sz="1600" dirty="0">
+              <a:solidFill>
+                <a:schemeClr val="tx1"/>
+              </a:solidFill>
+              <a:latin typeface="Helvetica"/>
+              <a:cs typeface="Helvetica"/>
+            </a:endParaRPr>
+          </a:p>
+        </p:txBody>
+      </p:sp>
+      <p:sp>
+        <p:nvSpPr>
+          <p:cNvPr id="35" name="Rounded Rectangle 34">
+            <a:extLst>
+              <a:ext uri="{FF2B5EF4-FFF2-40B4-BE49-F238E27FC236}">
+                <a16:creationId xmlns:a16="http://schemas.microsoft.com/office/drawing/2014/main" id="{38EF30AC-2E3C-FC7D-55AB-FB603719A493}"/>
+              </a:ext>
+            </a:extLst>
+          </p:cNvPr>
+          <p:cNvSpPr/>
+          <p:nvPr/>
+        </p:nvSpPr>
+        <p:spPr>
+          <a:xfrm>
+            <a:off x="7523521" y="4153097"/>
+            <a:ext cx="1521071" cy="343387"/>
+          </a:xfrm>
+          <a:prstGeom prst="roundRect">
+            <a:avLst/>
+          </a:prstGeom>
+          <a:solidFill>
+            <a:schemeClr val="accent6">
+              <a:lumMod val="20000"/>
+              <a:lumOff val="80000"/>
+              <a:alpha val="15000"/>
+            </a:schemeClr>
+          </a:solidFill>
+        </p:spPr>
+        <p:style>
+          <a:lnRef idx="1">
+            <a:schemeClr val="accent1"/>
+          </a:lnRef>
+          <a:fillRef idx="3">
+            <a:schemeClr val="accent1"/>
+          </a:fillRef>
+          <a:effectRef idx="2">
+            <a:schemeClr val="accent1"/>
+          </a:effectRef>
+          <a:fontRef idx="minor">
+            <a:schemeClr val="lt1"/>
+          </a:fontRef>
+        </p:style>
+        <p:txBody>
+          <a:bodyPr rtlCol="0" anchor="ctr"/>
+          <a:lstStyle/>
+          <a:p>
+            <a:pPr algn="ctr"/>
+            <a:r>
+              <a:rPr lang="en-US" sz="1600" dirty="0">
+                <a:solidFill>
+                  <a:schemeClr val="tx1"/>
+                </a:solidFill>
+                <a:latin typeface="Helvetica"/>
+                <a:cs typeface="Helvetica"/>
+              </a:rPr>
+              <a:t>Annotated </a:t>
+            </a:r>
+            <a:r>
+              <a:rPr lang="en-US" sz="1600" dirty="0" err="1">
+                <a:solidFill>
+                  <a:schemeClr val="tx1"/>
+                </a:solidFill>
+                <a:latin typeface="Helvetica"/>
+                <a:cs typeface="Helvetica"/>
+              </a:rPr>
+              <a:t>FIs</a:t>
+            </a:r>
+            <a:endParaRPr lang="en-US" sz="1600" dirty="0">
+              <a:solidFill>
+                <a:schemeClr val="tx1"/>
+              </a:solidFill>
+              <a:latin typeface="Helvetica"/>
+              <a:cs typeface="Helvetica"/>
+            </a:endParaRPr>
+          </a:p>
+        </p:txBody>
+      </p:sp>
+      <p:sp>
+        <p:nvSpPr>
+          <p:cNvPr id="38" name="Rounded Rectangle 37">
+            <a:extLst>
+              <a:ext uri="{FF2B5EF4-FFF2-40B4-BE49-F238E27FC236}">
+                <a16:creationId xmlns:a16="http://schemas.microsoft.com/office/drawing/2014/main" id="{BBFDC4DF-CFFF-15E8-11DA-04D7D96D804D}"/>
+              </a:ext>
+            </a:extLst>
+          </p:cNvPr>
+          <p:cNvSpPr/>
+          <p:nvPr/>
+        </p:nvSpPr>
+        <p:spPr>
+          <a:xfrm>
+            <a:off x="6661606" y="5621246"/>
+            <a:ext cx="1351826" cy="343387"/>
+          </a:xfrm>
+          <a:prstGeom prst="roundRect">
+            <a:avLst/>
+          </a:prstGeom>
+          <a:solidFill>
+            <a:schemeClr val="accent6">
+              <a:lumMod val="20000"/>
+              <a:lumOff val="80000"/>
+              <a:alpha val="15000"/>
+            </a:schemeClr>
+          </a:solidFill>
+        </p:spPr>
+        <p:style>
+          <a:lnRef idx="1">
+            <a:schemeClr val="accent1"/>
+          </a:lnRef>
+          <a:fillRef idx="3">
+            <a:schemeClr val="accent1"/>
+          </a:fillRef>
+          <a:effectRef idx="2">
+            <a:schemeClr val="accent1"/>
+          </a:effectRef>
+          <a:fontRef idx="minor">
+            <a:schemeClr val="lt1"/>
+          </a:fontRef>
+        </p:style>
+        <p:txBody>
+          <a:bodyPr rtlCol="0" anchor="ctr"/>
+          <a:lstStyle/>
+          <a:p>
+            <a:pPr algn="ctr"/>
+            <a:r>
+              <a:rPr lang="en-US" sz="1600" dirty="0">
+                <a:solidFill>
+                  <a:schemeClr val="tx1"/>
+                </a:solidFill>
+                <a:latin typeface="Helvetica"/>
+                <a:cs typeface="Helvetica"/>
+              </a:rPr>
+              <a:t>FI Network</a:t>
+            </a:r>
+          </a:p>
+        </p:txBody>
+      </p:sp>
+      <p:cxnSp>
+        <p:nvCxnSpPr>
+          <p:cNvPr id="67" name="Straight Arrow Connector 60">
+            <a:extLst>
+              <a:ext uri="{FF2B5EF4-FFF2-40B4-BE49-F238E27FC236}">
+                <a16:creationId xmlns:a16="http://schemas.microsoft.com/office/drawing/2014/main" id="{CF210073-9D49-7C52-0048-DFECD88CD93A}"/>
+              </a:ext>
+            </a:extLst>
+          </p:cNvPr>
+          <p:cNvCxnSpPr>
+            <a:cxnSpLocks/>
+            <a:stCxn id="31" idx="2"/>
+            <a:endCxn id="35" idx="0"/>
+          </p:cNvCxnSpPr>
+          <p:nvPr/>
+        </p:nvCxnSpPr>
+        <p:spPr bwMode="auto">
+          <a:xfrm rot="16200000" flipH="1">
+            <a:off x="7786423" y="3655462"/>
+            <a:ext cx="790985" cy="204283"/>
+          </a:xfrm>
+          <a:prstGeom prst="bentConnector3">
+            <a:avLst>
+              <a:gd name="adj1" fmla="val 50000"/>
+            </a:avLst>
+          </a:prstGeom>
+          <a:solidFill>
+            <a:schemeClr val="accent1"/>
+          </a:solidFill>
+          <a:ln w="12700" cap="flat" cmpd="sng" algn="ctr">
+            <a:solidFill>
+              <a:schemeClr val="tx1"/>
+            </a:solidFill>
+            <a:prstDash val="solid"/>
+            <a:round/>
+            <a:headEnd type="none" w="med" len="med"/>
+            <a:tailEnd type="triangle"/>
+          </a:ln>
+          <a:effectLst/>
+        </p:spPr>
+      </p:cxnSp>
+      <p:sp>
+        <p:nvSpPr>
+          <p:cNvPr id="70" name="TextBox 69">
+            <a:extLst>
+              <a:ext uri="{FF2B5EF4-FFF2-40B4-BE49-F238E27FC236}">
+                <a16:creationId xmlns:a16="http://schemas.microsoft.com/office/drawing/2014/main" id="{72F4C5A8-7B09-C5EB-5B12-FC426253545E}"/>
+              </a:ext>
+            </a:extLst>
+          </p:cNvPr>
           <p:cNvSpPr txBox="1"/>
           <p:nvPr/>
         </p:nvSpPr>
         <p:spPr>
           <a:xfrm>
-            <a:off x="4262381" y="5976094"/>
-            <a:ext cx="4862540" cy="861774"/>
-          </a:xfrm>
-          <a:prstGeom prst="rect">
-            <a:avLst/>
-          </a:prstGeom>
-        </p:spPr>
-        <p:style>
-          <a:lnRef idx="1">
-            <a:schemeClr val="accent1"/>
-          </a:lnRef>
-          <a:fillRef idx="2">
-            <a:schemeClr val="accent1"/>
-          </a:fillRef>
-          <a:effectRef idx="1">
-            <a:schemeClr val="accent1"/>
-          </a:effectRef>
-          <a:fontRef idx="minor">
-            <a:schemeClr val="dk1"/>
-          </a:fontRef>
-        </p:style>
-        <p:txBody>
-          <a:bodyPr wrap="square" rtlCol="0">
-            <a:spAutoFit/>
-          </a:bodyPr>
-          <a:lstStyle/>
-          <a:p>
-            <a:r>
-              <a:rPr lang="en-US" sz="1000" dirty="0" smtClean="0"/>
-              <a:t>1. Lin, A.; Wang, R. T.; </a:t>
-            </a:r>
-            <a:r>
-              <a:rPr lang="en-US" sz="1000" dirty="0" err="1" smtClean="0"/>
-              <a:t>Ahn</a:t>
-            </a:r>
-            <a:r>
-              <a:rPr lang="en-US" sz="1000" dirty="0" smtClean="0"/>
-              <a:t>, S.; Park, C. C. &amp; Smith, D. J. (2010). </a:t>
-            </a:r>
-            <a:r>
-              <a:rPr lang="en-US" sz="1000" i="1" dirty="0" smtClean="0"/>
-              <a:t>Genome Res </a:t>
-            </a:r>
-            <a:r>
-              <a:rPr lang="en-US" sz="1000" b="1" i="1" dirty="0" smtClean="0"/>
-              <a:t>20(8), 1122—1132</a:t>
-            </a:r>
-            <a:r>
-              <a:rPr lang="en-US" sz="1000" b="1" i="1" dirty="0" smtClean="0"/>
-              <a:t>. (Note: This data set is not used)</a:t>
-            </a:r>
-            <a:endParaRPr lang="en-US" sz="1000" dirty="0" smtClean="0"/>
-          </a:p>
-          <a:p>
-            <a:r>
-              <a:rPr lang="en-US" sz="1000" dirty="0" smtClean="0"/>
-              <a:t>2. Data has not been changed since last build</a:t>
-            </a:r>
-          </a:p>
-          <a:p>
-            <a:r>
-              <a:rPr lang="en-US" sz="1000" dirty="0" smtClean="0"/>
-              <a:t>3. These pathways or features will not be included in this build? Need to check how many </a:t>
-            </a:r>
-            <a:r>
-              <a:rPr lang="en-US" sz="1000" dirty="0" err="1" smtClean="0"/>
-              <a:t>Fis</a:t>
-            </a:r>
-            <a:r>
-              <a:rPr lang="en-US" sz="1000" dirty="0" smtClean="0"/>
-              <a:t> contributed from NCI-</a:t>
-            </a:r>
-            <a:r>
-              <a:rPr lang="en-US" sz="1000" dirty="0" err="1" smtClean="0"/>
-              <a:t>BioCarta</a:t>
-            </a:r>
-            <a:r>
-              <a:rPr lang="en-US" sz="1000" dirty="0" smtClean="0"/>
-              <a:t>, and </a:t>
-            </a:r>
-            <a:r>
-              <a:rPr lang="en-US" sz="1000" dirty="0" err="1" smtClean="0"/>
-              <a:t>CellMap</a:t>
-            </a:r>
-            <a:r>
-              <a:rPr lang="en-US" sz="1000" dirty="0" smtClean="0"/>
-              <a:t>.</a:t>
-            </a:r>
-          </a:p>
-        </p:txBody>
-      </p:sp>
-      <p:sp>
-        <p:nvSpPr>
-          <p:cNvPr id="24" name="TextBox 23"/>
-          <p:cNvSpPr txBox="1"/>
-          <p:nvPr/>
-        </p:nvSpPr>
-        <p:spPr>
-          <a:xfrm>
-            <a:off x="8053323" y="3934765"/>
-            <a:ext cx="335857" cy="235962"/>
+            <a:off x="8033211" y="3449024"/>
+            <a:ext cx="763029" cy="338554"/>
           </a:xfrm>
           <a:prstGeom prst="rect">
             <a:avLst/>
@@ -5130,197 +7682,98 @@
           <a:lstStyle/>
           <a:p>
             <a:r>
-              <a:rPr lang="en-US" sz="1400" baseline="30000" dirty="0" smtClean="0"/>
-              <a:t>2,3</a:t>
-            </a:r>
-            <a:endParaRPr lang="en-US" sz="1400" baseline="30000" dirty="0"/>
-          </a:p>
-        </p:txBody>
-      </p:sp>
-      <p:sp>
-        <p:nvSpPr>
-          <p:cNvPr id="42" name="TextBox 41"/>
-          <p:cNvSpPr txBox="1"/>
+              <a:rPr lang="en-US" sz="1600" dirty="0"/>
+              <a:t>extract</a:t>
+            </a:r>
+          </a:p>
+        </p:txBody>
+      </p:sp>
+      <p:cxnSp>
+        <p:nvCxnSpPr>
+          <p:cNvPr id="71" name="Straight Arrow Connector 60">
+            <a:extLst>
+              <a:ext uri="{FF2B5EF4-FFF2-40B4-BE49-F238E27FC236}">
+                <a16:creationId xmlns:a16="http://schemas.microsoft.com/office/drawing/2014/main" id="{8759304C-A3BB-3ACC-9371-6AD22C1B2135}"/>
+              </a:ext>
+            </a:extLst>
+          </p:cNvPr>
+          <p:cNvCxnSpPr>
+            <a:cxnSpLocks/>
+            <a:stCxn id="35" idx="2"/>
+            <a:endCxn id="38" idx="0"/>
+          </p:cNvCxnSpPr>
           <p:nvPr/>
-        </p:nvSpPr>
-        <p:spPr>
-          <a:xfrm>
-            <a:off x="3289717" y="1364116"/>
-            <a:ext cx="248786" cy="235962"/>
-          </a:xfrm>
-          <a:prstGeom prst="rect">
-            <a:avLst/>
-          </a:prstGeom>
-          <a:noFill/>
-        </p:spPr>
-        <p:txBody>
-          <a:bodyPr wrap="none" rtlCol="0">
-            <a:spAutoFit/>
-          </a:bodyPr>
-          <a:lstStyle/>
-          <a:p>
-            <a:r>
-              <a:rPr lang="en-US" sz="1400" baseline="30000" dirty="0" smtClean="0"/>
-              <a:t>2</a:t>
-            </a:r>
-            <a:endParaRPr lang="en-US" sz="1400" baseline="30000" dirty="0"/>
-          </a:p>
-        </p:txBody>
-      </p:sp>
-      <p:sp>
-        <p:nvSpPr>
-          <p:cNvPr id="43" name="TextBox 42"/>
-          <p:cNvSpPr txBox="1"/>
+        </p:nvCxnSpPr>
+        <p:spPr bwMode="auto">
+          <a:xfrm rot="5400000">
+            <a:off x="7248407" y="4585596"/>
+            <a:ext cx="1124762" cy="946538"/>
+          </a:xfrm>
+          <a:prstGeom prst="bentConnector3">
+            <a:avLst>
+              <a:gd name="adj1" fmla="val 50000"/>
+            </a:avLst>
+          </a:prstGeom>
+          <a:solidFill>
+            <a:schemeClr val="accent1"/>
+          </a:solidFill>
+          <a:ln w="12700" cap="flat" cmpd="sng" algn="ctr">
+            <a:solidFill>
+              <a:schemeClr val="tx1"/>
+            </a:solidFill>
+            <a:prstDash val="solid"/>
+            <a:round/>
+            <a:headEnd type="none" w="med" len="med"/>
+            <a:tailEnd type="triangle"/>
+          </a:ln>
+          <a:effectLst/>
+        </p:spPr>
+      </p:cxnSp>
+      <p:cxnSp>
+        <p:nvCxnSpPr>
+          <p:cNvPr id="72" name="Straight Arrow Connector 60">
+            <a:extLst>
+              <a:ext uri="{FF2B5EF4-FFF2-40B4-BE49-F238E27FC236}">
+                <a16:creationId xmlns:a16="http://schemas.microsoft.com/office/drawing/2014/main" id="{F0D05059-084E-ECFF-4C9F-DF22B8C83BF1}"/>
+              </a:ext>
+            </a:extLst>
+          </p:cNvPr>
+          <p:cNvCxnSpPr>
+            <a:cxnSpLocks/>
+            <a:stCxn id="34" idx="2"/>
+            <a:endCxn id="38" idx="0"/>
+          </p:cNvCxnSpPr>
           <p:nvPr/>
-        </p:nvSpPr>
-        <p:spPr>
-          <a:xfrm>
-            <a:off x="7585811" y="1368993"/>
-            <a:ext cx="248786" cy="235962"/>
-          </a:xfrm>
-          <a:prstGeom prst="rect">
-            <a:avLst/>
-          </a:prstGeom>
-          <a:noFill/>
-        </p:spPr>
-        <p:txBody>
-          <a:bodyPr wrap="none" rtlCol="0">
-            <a:spAutoFit/>
-          </a:bodyPr>
-          <a:lstStyle/>
-          <a:p>
-            <a:r>
-              <a:rPr lang="en-US" sz="1400" baseline="30000" dirty="0" smtClean="0"/>
-              <a:t>2</a:t>
-            </a:r>
-            <a:endParaRPr lang="en-US" sz="1400" baseline="30000" dirty="0"/>
-          </a:p>
-        </p:txBody>
-      </p:sp>
-      <p:sp>
-        <p:nvSpPr>
-          <p:cNvPr id="44" name="TextBox 43"/>
-          <p:cNvSpPr txBox="1"/>
-          <p:nvPr/>
-        </p:nvSpPr>
-        <p:spPr>
-          <a:xfrm>
-            <a:off x="5637988" y="1731951"/>
-            <a:ext cx="335857" cy="235962"/>
-          </a:xfrm>
-          <a:prstGeom prst="rect">
-            <a:avLst/>
-          </a:prstGeom>
-          <a:noFill/>
-        </p:spPr>
-        <p:txBody>
-          <a:bodyPr wrap="none" rtlCol="0">
-            <a:spAutoFit/>
-          </a:bodyPr>
-          <a:lstStyle/>
-          <a:p>
-            <a:r>
-              <a:rPr lang="en-US" sz="1400" baseline="30000" dirty="0" smtClean="0"/>
-              <a:t>2,3</a:t>
-            </a:r>
-            <a:endParaRPr lang="en-US" sz="1400" baseline="30000" dirty="0"/>
-          </a:p>
-        </p:txBody>
-      </p:sp>
-      <p:sp>
-        <p:nvSpPr>
-          <p:cNvPr id="45" name="TextBox 44"/>
-          <p:cNvSpPr txBox="1"/>
-          <p:nvPr/>
-        </p:nvSpPr>
-        <p:spPr>
-          <a:xfrm>
-            <a:off x="7834597" y="3270034"/>
-            <a:ext cx="335857" cy="235962"/>
-          </a:xfrm>
-          <a:prstGeom prst="rect">
-            <a:avLst/>
-          </a:prstGeom>
-          <a:noFill/>
-        </p:spPr>
-        <p:txBody>
-          <a:bodyPr wrap="none" rtlCol="0">
-            <a:spAutoFit/>
-          </a:bodyPr>
-          <a:lstStyle/>
-          <a:p>
-            <a:r>
-              <a:rPr lang="en-US" sz="1400" baseline="30000" dirty="0" smtClean="0"/>
-              <a:t>2,3</a:t>
-            </a:r>
-            <a:endParaRPr lang="en-US" sz="1400" baseline="30000" dirty="0"/>
-          </a:p>
-        </p:txBody>
-      </p:sp>
-      <p:sp>
-        <p:nvSpPr>
-          <p:cNvPr id="46" name="TextBox 45"/>
-          <p:cNvSpPr txBox="1"/>
-          <p:nvPr/>
-        </p:nvSpPr>
-        <p:spPr>
-          <a:xfrm>
-            <a:off x="7758658" y="4570447"/>
-            <a:ext cx="248786" cy="235962"/>
-          </a:xfrm>
-          <a:prstGeom prst="rect">
-            <a:avLst/>
-          </a:prstGeom>
-          <a:noFill/>
-        </p:spPr>
-        <p:txBody>
-          <a:bodyPr wrap="none" rtlCol="0">
-            <a:spAutoFit/>
-          </a:bodyPr>
-          <a:lstStyle/>
-          <a:p>
-            <a:r>
-              <a:rPr lang="en-US" sz="1400" baseline="30000" dirty="0" smtClean="0"/>
-              <a:t>2</a:t>
-            </a:r>
-            <a:endParaRPr lang="en-US" sz="1400" baseline="30000" dirty="0"/>
-          </a:p>
-        </p:txBody>
-      </p:sp>
-      <p:sp>
-        <p:nvSpPr>
-          <p:cNvPr id="47" name="TextBox 46"/>
-          <p:cNvSpPr txBox="1"/>
-          <p:nvPr/>
-        </p:nvSpPr>
-        <p:spPr>
-          <a:xfrm>
-            <a:off x="7840322" y="2965089"/>
-            <a:ext cx="335857" cy="235962"/>
-          </a:xfrm>
-          <a:prstGeom prst="rect">
-            <a:avLst/>
-          </a:prstGeom>
-          <a:noFill/>
-        </p:spPr>
-        <p:txBody>
-          <a:bodyPr wrap="none" rtlCol="0">
-            <a:spAutoFit/>
-          </a:bodyPr>
-          <a:lstStyle/>
-          <a:p>
-            <a:r>
-              <a:rPr lang="en-US" sz="1400" baseline="30000" dirty="0" smtClean="0"/>
-              <a:t>2,3</a:t>
-            </a:r>
-            <a:endParaRPr lang="en-US" sz="1400" baseline="30000" dirty="0"/>
-          </a:p>
-        </p:txBody>
-      </p:sp>
+        </p:nvCxnSpPr>
+        <p:spPr bwMode="auto">
+          <a:xfrm rot="16200000" flipH="1">
+            <a:off x="6344908" y="4628635"/>
+            <a:ext cx="1117686" cy="867536"/>
+          </a:xfrm>
+          <a:prstGeom prst="bentConnector3">
+            <a:avLst>
+              <a:gd name="adj1" fmla="val 50000"/>
+            </a:avLst>
+          </a:prstGeom>
+          <a:solidFill>
+            <a:schemeClr val="accent1"/>
+          </a:solidFill>
+          <a:ln w="12700" cap="flat" cmpd="sng" algn="ctr">
+            <a:solidFill>
+              <a:schemeClr val="tx1"/>
+            </a:solidFill>
+            <a:prstDash val="solid"/>
+            <a:round/>
+            <a:headEnd type="none" w="med" len="med"/>
+            <a:tailEnd type="triangle"/>
+          </a:ln>
+          <a:effectLst/>
+        </p:spPr>
+      </p:cxnSp>
     </p:spTree>
     <p:extLst>
       <p:ext uri="{BB962C8B-B14F-4D97-AF65-F5344CB8AC3E}">
-        <p14:creationId xmlns:p14="http://schemas.microsoft.com/office/powerpoint/2010/main" val="3334401698"/>
+        <p14:creationId xmlns:p14="http://schemas.microsoft.com/office/powerpoint/2010/main" val="3610220007"/>
       </p:ext>
     </p:extLst>
   </p:cSld>
@@ -5648,4 +8101,299 @@
   </a:objectDefaults>
   <a:extraClrSchemeLst/>
 </a:theme>
+</file>
+
+<file path=ppt/theme/theme2.xml><?xml version="1.0" encoding="utf-8"?>
+<a:theme xmlns:a="http://schemas.openxmlformats.org/drawingml/2006/main" name="Office Theme">
+  <a:themeElements>
+    <a:clrScheme name="Office">
+      <a:dk1>
+        <a:sysClr val="windowText" lastClr="000000"/>
+      </a:dk1>
+      <a:lt1>
+        <a:sysClr val="window" lastClr="FFFFFF"/>
+      </a:lt1>
+      <a:dk2>
+        <a:srgbClr val="44546A"/>
+      </a:dk2>
+      <a:lt2>
+        <a:srgbClr val="E7E6E6"/>
+      </a:lt2>
+      <a:accent1>
+        <a:srgbClr val="4472C4"/>
+      </a:accent1>
+      <a:accent2>
+        <a:srgbClr val="ED7D31"/>
+      </a:accent2>
+      <a:accent3>
+        <a:srgbClr val="A5A5A5"/>
+      </a:accent3>
+      <a:accent4>
+        <a:srgbClr val="FFC000"/>
+      </a:accent4>
+      <a:accent5>
+        <a:srgbClr val="5B9BD5"/>
+      </a:accent5>
+      <a:accent6>
+        <a:srgbClr val="70AD47"/>
+      </a:accent6>
+      <a:hlink>
+        <a:srgbClr val="0563C1"/>
+      </a:hlink>
+      <a:folHlink>
+        <a:srgbClr val="954F72"/>
+      </a:folHlink>
+    </a:clrScheme>
+    <a:fontScheme name="Office">
+      <a:majorFont>
+        <a:latin typeface="Calibri Light" panose="020F0302020204030204"/>
+        <a:ea typeface=""/>
+        <a:cs typeface=""/>
+        <a:font script="Jpan" typeface="游ゴシック Light"/>
+        <a:font script="Hang" typeface="맑은 고딕"/>
+        <a:font script="Hans" typeface="等线 Light"/>
+        <a:font script="Hant" typeface="新細明體"/>
+        <a:font script="Arab" typeface="Times New Roman"/>
+        <a:font script="Hebr" typeface="Times New Roman"/>
+        <a:font script="Thai" typeface="Angsana New"/>
+        <a:font script="Ethi" typeface="Nyala"/>
+        <a:font script="Beng" typeface="Vrinda"/>
+        <a:font script="Gujr" typeface="Shruti"/>
+        <a:font script="Khmr" typeface="MoolBoran"/>
+        <a:font script="Knda" typeface="Tunga"/>
+        <a:font script="Guru" typeface="Raavi"/>
+        <a:font script="Cans" typeface="Euphemia"/>
+        <a:font script="Cher" typeface="Plantagenet Cherokee"/>
+        <a:font script="Yiii" typeface="Microsoft Yi Baiti"/>
+        <a:font script="Tibt" typeface="Microsoft Himalaya"/>
+        <a:font script="Thaa" typeface="MV Boli"/>
+        <a:font script="Deva" typeface="Mangal"/>
+        <a:font script="Telu" typeface="Gautami"/>
+        <a:font script="Taml" typeface="Latha"/>
+        <a:font script="Syrc" typeface="Estrangelo Edessa"/>
+        <a:font script="Orya" typeface="Kalinga"/>
+        <a:font script="Mlym" typeface="Kartika"/>
+        <a:font script="Laoo" typeface="DokChampa"/>
+        <a:font script="Sinh" typeface="Iskoola Pota"/>
+        <a:font script="Mong" typeface="Mongolian Baiti"/>
+        <a:font script="Viet" typeface="Times New Roman"/>
+        <a:font script="Uigh" typeface="Microsoft Uighur"/>
+        <a:font script="Geor" typeface="Sylfaen"/>
+        <a:font script="Armn" typeface="Arial"/>
+        <a:font script="Bugi" typeface="Leelawadee UI"/>
+        <a:font script="Bopo" typeface="Microsoft JhengHei"/>
+        <a:font script="Java" typeface="Javanese Text"/>
+        <a:font script="Lisu" typeface="Segoe UI"/>
+        <a:font script="Mymr" typeface="Myanmar Text"/>
+        <a:font script="Nkoo" typeface="Ebrima"/>
+        <a:font script="Olck" typeface="Nirmala UI"/>
+        <a:font script="Osma" typeface="Ebrima"/>
+        <a:font script="Phag" typeface="Phagspa"/>
+        <a:font script="Syrn" typeface="Estrangelo Edessa"/>
+        <a:font script="Syrj" typeface="Estrangelo Edessa"/>
+        <a:font script="Syre" typeface="Estrangelo Edessa"/>
+        <a:font script="Sora" typeface="Nirmala UI"/>
+        <a:font script="Tale" typeface="Microsoft Tai Le"/>
+        <a:font script="Talu" typeface="Microsoft New Tai Lue"/>
+        <a:font script="Tfng" typeface="Ebrima"/>
+      </a:majorFont>
+      <a:minorFont>
+        <a:latin typeface="Calibri" panose="020F0502020204030204"/>
+        <a:ea typeface=""/>
+        <a:cs typeface=""/>
+        <a:font script="Jpan" typeface="游ゴシック"/>
+        <a:font script="Hang" typeface="맑은 고딕"/>
+        <a:font script="Hans" typeface="等线"/>
+        <a:font script="Hant" typeface="新細明體"/>
+        <a:font script="Arab" typeface="Arial"/>
+        <a:font script="Hebr" typeface="Arial"/>
+        <a:font script="Thai" typeface="Cordia New"/>
+        <a:font script="Ethi" typeface="Nyala"/>
+        <a:font script="Beng" typeface="Vrinda"/>
+        <a:font script="Gujr" typeface="Shruti"/>
+        <a:font script="Khmr" typeface="DaunPenh"/>
+        <a:font script="Knda" typeface="Tunga"/>
+        <a:font script="Guru" typeface="Raavi"/>
+        <a:font script="Cans" typeface="Euphemia"/>
+        <a:font script="Cher" typeface="Plantagenet Cherokee"/>
+        <a:font script="Yiii" typeface="Microsoft Yi Baiti"/>
+        <a:font script="Tibt" typeface="Microsoft Himalaya"/>
+        <a:font script="Thaa" typeface="MV Boli"/>
+        <a:font script="Deva" typeface="Mangal"/>
+        <a:font script="Telu" typeface="Gautami"/>
+        <a:font script="Taml" typeface="Latha"/>
+        <a:font script="Syrc" typeface="Estrangelo Edessa"/>
+        <a:font script="Orya" typeface="Kalinga"/>
+        <a:font script="Mlym" typeface="Kartika"/>
+        <a:font script="Laoo" typeface="DokChampa"/>
+        <a:font script="Sinh" typeface="Iskoola Pota"/>
+        <a:font script="Mong" typeface="Mongolian Baiti"/>
+        <a:font script="Viet" typeface="Arial"/>
+        <a:font script="Uigh" typeface="Microsoft Uighur"/>
+        <a:font script="Geor" typeface="Sylfaen"/>
+        <a:font script="Armn" typeface="Arial"/>
+        <a:font script="Bugi" typeface="Leelawadee UI"/>
+        <a:font script="Bopo" typeface="Microsoft JhengHei"/>
+        <a:font script="Java" typeface="Javanese Text"/>
+        <a:font script="Lisu" typeface="Segoe UI"/>
+        <a:font script="Mymr" typeface="Myanmar Text"/>
+        <a:font script="Nkoo" typeface="Ebrima"/>
+        <a:font script="Olck" typeface="Nirmala UI"/>
+        <a:font script="Osma" typeface="Ebrima"/>
+        <a:font script="Phag" typeface="Phagspa"/>
+        <a:font script="Syrn" typeface="Estrangelo Edessa"/>
+        <a:font script="Syrj" typeface="Estrangelo Edessa"/>
+        <a:font script="Syre" typeface="Estrangelo Edessa"/>
+        <a:font script="Sora" typeface="Nirmala UI"/>
+        <a:font script="Tale" typeface="Microsoft Tai Le"/>
+        <a:font script="Talu" typeface="Microsoft New Tai Lue"/>
+        <a:font script="Tfng" typeface="Ebrima"/>
+      </a:minorFont>
+    </a:fontScheme>
+    <a:fmtScheme name="Office">
+      <a:fillStyleLst>
+        <a:solidFill>
+          <a:schemeClr val="phClr"/>
+        </a:solidFill>
+        <a:gradFill rotWithShape="1">
+          <a:gsLst>
+            <a:gs pos="0">
+              <a:schemeClr val="phClr">
+                <a:lumMod val="110000"/>
+                <a:satMod val="105000"/>
+                <a:tint val="67000"/>
+              </a:schemeClr>
+            </a:gs>
+            <a:gs pos="50000">
+              <a:schemeClr val="phClr">
+                <a:lumMod val="105000"/>
+                <a:satMod val="103000"/>
+                <a:tint val="73000"/>
+              </a:schemeClr>
+            </a:gs>
+            <a:gs pos="100000">
+              <a:schemeClr val="phClr">
+                <a:lumMod val="105000"/>
+                <a:satMod val="109000"/>
+                <a:tint val="81000"/>
+              </a:schemeClr>
+            </a:gs>
+          </a:gsLst>
+          <a:lin ang="5400000" scaled="0"/>
+        </a:gradFill>
+        <a:gradFill rotWithShape="1">
+          <a:gsLst>
+            <a:gs pos="0">
+              <a:schemeClr val="phClr">
+                <a:satMod val="103000"/>
+                <a:lumMod val="102000"/>
+                <a:tint val="94000"/>
+              </a:schemeClr>
+            </a:gs>
+            <a:gs pos="50000">
+              <a:schemeClr val="phClr">
+                <a:satMod val="110000"/>
+                <a:lumMod val="100000"/>
+                <a:shade val="100000"/>
+              </a:schemeClr>
+            </a:gs>
+            <a:gs pos="100000">
+              <a:schemeClr val="phClr">
+                <a:lumMod val="99000"/>
+                <a:satMod val="120000"/>
+                <a:shade val="78000"/>
+              </a:schemeClr>
+            </a:gs>
+          </a:gsLst>
+          <a:lin ang="5400000" scaled="0"/>
+        </a:gradFill>
+      </a:fillStyleLst>
+      <a:lnStyleLst>
+        <a:ln w="6350" cap="flat" cmpd="sng" algn="ctr">
+          <a:solidFill>
+            <a:schemeClr val="phClr"/>
+          </a:solidFill>
+          <a:prstDash val="solid"/>
+          <a:miter lim="800000"/>
+        </a:ln>
+        <a:ln w="12700" cap="flat" cmpd="sng" algn="ctr">
+          <a:solidFill>
+            <a:schemeClr val="phClr"/>
+          </a:solidFill>
+          <a:prstDash val="solid"/>
+          <a:miter lim="800000"/>
+        </a:ln>
+        <a:ln w="19050" cap="flat" cmpd="sng" algn="ctr">
+          <a:solidFill>
+            <a:schemeClr val="phClr"/>
+          </a:solidFill>
+          <a:prstDash val="solid"/>
+          <a:miter lim="800000"/>
+        </a:ln>
+      </a:lnStyleLst>
+      <a:effectStyleLst>
+        <a:effectStyle>
+          <a:effectLst/>
+        </a:effectStyle>
+        <a:effectStyle>
+          <a:effectLst/>
+        </a:effectStyle>
+        <a:effectStyle>
+          <a:effectLst>
+            <a:outerShdw blurRad="57150" dist="19050" dir="5400000" algn="ctr" rotWithShape="0">
+              <a:srgbClr val="000000">
+                <a:alpha val="63000"/>
+              </a:srgbClr>
+            </a:outerShdw>
+          </a:effectLst>
+        </a:effectStyle>
+      </a:effectStyleLst>
+      <a:bgFillStyleLst>
+        <a:solidFill>
+          <a:schemeClr val="phClr"/>
+        </a:solidFill>
+        <a:solidFill>
+          <a:schemeClr val="phClr">
+            <a:tint val="95000"/>
+            <a:satMod val="170000"/>
+          </a:schemeClr>
+        </a:solidFill>
+        <a:gradFill rotWithShape="1">
+          <a:gsLst>
+            <a:gs pos="0">
+              <a:schemeClr val="phClr">
+                <a:tint val="93000"/>
+                <a:satMod val="150000"/>
+                <a:shade val="98000"/>
+                <a:lumMod val="102000"/>
+              </a:schemeClr>
+            </a:gs>
+            <a:gs pos="50000">
+              <a:schemeClr val="phClr">
+                <a:tint val="98000"/>
+                <a:satMod val="130000"/>
+                <a:shade val="90000"/>
+                <a:lumMod val="103000"/>
+              </a:schemeClr>
+            </a:gs>
+            <a:gs pos="100000">
+              <a:schemeClr val="phClr">
+                <a:shade val="63000"/>
+                <a:satMod val="120000"/>
+              </a:schemeClr>
+            </a:gs>
+          </a:gsLst>
+          <a:lin ang="5400000" scaled="0"/>
+        </a:gradFill>
+      </a:bgFillStyleLst>
+    </a:fmtScheme>
+  </a:themeElements>
+  <a:objectDefaults/>
+  <a:extraClrSchemeLst/>
+  <a:extLst>
+    <a:ext uri="{05A4C25C-085E-4340-85A3-A5531E510DB2}">
+      <thm15:themeFamily xmlns:thm15="http://schemas.microsoft.com/office/thememl/2012/main" name="Office Theme" id="{62F939B6-93AF-4DB8-9C6B-D6C7DFDC589F}" vid="{4A3C46E8-61CC-4603-A589-7422A47A8E4A}"/>
+    </a:ext>
+  </a:extLst>
+</a:theme>
 </file>
</xml_diff>